<commit_message>
updated definitions NB w new figure
</commit_message>
<xml_diff>
--- a/misc/class_hierarchy.pptx
+++ b/misc/class_hierarchy.pptx
@@ -108,6 +108,11 @@
       </a:defRPr>
     </a:lvl9pPr>
   </p:defaultTextStyle>
+  <p:extLst>
+    <p:ext uri="{EFAFB233-063F-42B5-8137-9DF3F51BA10A}">
+      <p15:sldGuideLst xmlns:p15="http://schemas.microsoft.com/office/powerpoint/2012/main"/>
+    </p:ext>
+  </p:extLst>
 </p:presentation>
 </file>
 
@@ -193,7 +198,7 @@
           <a:p>
             <a:fld id="{217EA173-C20C-654E-BBD4-01566C4CADA4}" type="datetimeFigureOut">
               <a:rPr lang="en-US" smtClean="0"/>
-              <a:t>2/13/26</a:t>
+              <a:t>2/14/26</a:t>
             </a:fld>
             <a:endParaRPr lang="en-US"/>
           </a:p>
@@ -691,7 +696,7 @@
           <a:p>
             <a:fld id="{25B636A6-3787-D54C-97B5-792BCE062A68}" type="datetimeFigureOut">
               <a:rPr lang="en-US" smtClean="0"/>
-              <a:t>2/13/26</a:t>
+              <a:t>2/14/26</a:t>
             </a:fld>
             <a:endParaRPr lang="en-US"/>
           </a:p>
@@ -889,7 +894,7 @@
           <a:p>
             <a:fld id="{25B636A6-3787-D54C-97B5-792BCE062A68}" type="datetimeFigureOut">
               <a:rPr lang="en-US" smtClean="0"/>
-              <a:t>2/13/26</a:t>
+              <a:t>2/14/26</a:t>
             </a:fld>
             <a:endParaRPr lang="en-US"/>
           </a:p>
@@ -1097,7 +1102,7 @@
           <a:p>
             <a:fld id="{25B636A6-3787-D54C-97B5-792BCE062A68}" type="datetimeFigureOut">
               <a:rPr lang="en-US" smtClean="0"/>
-              <a:t>2/13/26</a:t>
+              <a:t>2/14/26</a:t>
             </a:fld>
             <a:endParaRPr lang="en-US"/>
           </a:p>
@@ -1295,7 +1300,7 @@
           <a:p>
             <a:fld id="{25B636A6-3787-D54C-97B5-792BCE062A68}" type="datetimeFigureOut">
               <a:rPr lang="en-US" smtClean="0"/>
-              <a:t>2/13/26</a:t>
+              <a:t>2/14/26</a:t>
             </a:fld>
             <a:endParaRPr lang="en-US"/>
           </a:p>
@@ -1570,7 +1575,7 @@
           <a:p>
             <a:fld id="{25B636A6-3787-D54C-97B5-792BCE062A68}" type="datetimeFigureOut">
               <a:rPr lang="en-US" smtClean="0"/>
-              <a:t>2/13/26</a:t>
+              <a:t>2/14/26</a:t>
             </a:fld>
             <a:endParaRPr lang="en-US"/>
           </a:p>
@@ -1835,7 +1840,7 @@
           <a:p>
             <a:fld id="{25B636A6-3787-D54C-97B5-792BCE062A68}" type="datetimeFigureOut">
               <a:rPr lang="en-US" smtClean="0"/>
-              <a:t>2/13/26</a:t>
+              <a:t>2/14/26</a:t>
             </a:fld>
             <a:endParaRPr lang="en-US"/>
           </a:p>
@@ -2247,7 +2252,7 @@
           <a:p>
             <a:fld id="{25B636A6-3787-D54C-97B5-792BCE062A68}" type="datetimeFigureOut">
               <a:rPr lang="en-US" smtClean="0"/>
-              <a:t>2/13/26</a:t>
+              <a:t>2/14/26</a:t>
             </a:fld>
             <a:endParaRPr lang="en-US"/>
           </a:p>
@@ -2388,7 +2393,7 @@
           <a:p>
             <a:fld id="{25B636A6-3787-D54C-97B5-792BCE062A68}" type="datetimeFigureOut">
               <a:rPr lang="en-US" smtClean="0"/>
-              <a:t>2/13/26</a:t>
+              <a:t>2/14/26</a:t>
             </a:fld>
             <a:endParaRPr lang="en-US"/>
           </a:p>
@@ -2501,7 +2506,7 @@
           <a:p>
             <a:fld id="{25B636A6-3787-D54C-97B5-792BCE062A68}" type="datetimeFigureOut">
               <a:rPr lang="en-US" smtClean="0"/>
-              <a:t>2/13/26</a:t>
+              <a:t>2/14/26</a:t>
             </a:fld>
             <a:endParaRPr lang="en-US"/>
           </a:p>
@@ -2812,7 +2817,7 @@
           <a:p>
             <a:fld id="{25B636A6-3787-D54C-97B5-792BCE062A68}" type="datetimeFigureOut">
               <a:rPr lang="en-US" smtClean="0"/>
-              <a:t>2/13/26</a:t>
+              <a:t>2/14/26</a:t>
             </a:fld>
             <a:endParaRPr lang="en-US"/>
           </a:p>
@@ -3100,7 +3105,7 @@
           <a:p>
             <a:fld id="{25B636A6-3787-D54C-97B5-792BCE062A68}" type="datetimeFigureOut">
               <a:rPr lang="en-US" smtClean="0"/>
-              <a:t>2/13/26</a:t>
+              <a:t>2/14/26</a:t>
             </a:fld>
             <a:endParaRPr lang="en-US"/>
           </a:p>
@@ -3341,7 +3346,7 @@
           <a:p>
             <a:fld id="{25B636A6-3787-D54C-97B5-792BCE062A68}" type="datetimeFigureOut">
               <a:rPr lang="en-US" smtClean="0"/>
-              <a:t>2/13/26</a:t>
+              <a:t>2/14/26</a:t>
             </a:fld>
             <a:endParaRPr lang="en-US"/>
           </a:p>
@@ -3879,1568 +3884,1981 @@
           </a:p>
         </p:txBody>
       </p:sp>
-      <p:sp>
-        <p:nvSpPr>
-          <p:cNvPr id="4" name="TextBox 3">
-            <a:extLst>
-              <a:ext uri="{FF2B5EF4-FFF2-40B4-BE49-F238E27FC236}">
-                <a16:creationId xmlns:a16="http://schemas.microsoft.com/office/drawing/2014/main" id="{98CB3E6F-FF6D-BC4E-627B-C3B8BF4D15CD}"/>
-              </a:ext>
-            </a:extLst>
-          </p:cNvPr>
-          <p:cNvSpPr txBox="1"/>
+      <p:grpSp>
+        <p:nvGrpSpPr>
+          <p:cNvPr id="54" name="Group 53">
+            <a:extLst>
+              <a:ext uri="{FF2B5EF4-FFF2-40B4-BE49-F238E27FC236}">
+                <a16:creationId xmlns:a16="http://schemas.microsoft.com/office/drawing/2014/main" id="{1BCE43CF-4BB5-BE6A-C7BA-403456F59ADA}"/>
+              </a:ext>
+            </a:extLst>
+          </p:cNvPr>
+          <p:cNvGrpSpPr/>
           <p:nvPr/>
-        </p:nvSpPr>
-        <p:spPr>
+        </p:nvGrpSpPr>
+        <p:grpSpPr>
           <a:xfrm>
-            <a:off x="4152394" y="1409276"/>
-            <a:ext cx="923651" cy="369332"/>
+            <a:off x="3180165" y="1001728"/>
+            <a:ext cx="7190166" cy="5102693"/>
+            <a:chOff x="3779254" y="654886"/>
+            <a:chExt cx="7190166" cy="5102693"/>
           </a:xfrm>
-          <a:prstGeom prst="rect">
-            <a:avLst/>
-          </a:prstGeom>
-          <a:noFill/>
-          <a:ln>
-            <a:solidFill>
+        </p:grpSpPr>
+        <p:sp>
+          <p:nvSpPr>
+            <p:cNvPr id="4" name="TextBox 3">
+              <a:extLst>
+                <a:ext uri="{FF2B5EF4-FFF2-40B4-BE49-F238E27FC236}">
+                  <a16:creationId xmlns:a16="http://schemas.microsoft.com/office/drawing/2014/main" id="{98CB3E6F-FF6D-BC4E-627B-C3B8BF4D15CD}"/>
+                </a:ext>
+              </a:extLst>
+            </p:cNvPr>
+            <p:cNvSpPr txBox="1"/>
+            <p:nvPr/>
+          </p:nvSpPr>
+          <p:spPr>
+            <a:xfrm>
+              <a:off x="4731547" y="1644180"/>
+              <a:ext cx="923651" cy="369332"/>
+            </a:xfrm>
+            <a:prstGeom prst="rect">
+              <a:avLst/>
+            </a:prstGeom>
+            <a:noFill/>
+            <a:ln>
+              <a:solidFill>
+                <a:schemeClr val="tx1"/>
+              </a:solidFill>
+            </a:ln>
+          </p:spPr>
+          <p:txBody>
+            <a:bodyPr wrap="none" rtlCol="0">
+              <a:spAutoFit/>
+            </a:bodyPr>
+            <a:lstStyle/>
+            <a:p>
+              <a:r>
+                <a:rPr lang="en-US" dirty="0"/>
+                <a:t>Magma</a:t>
+              </a:r>
+            </a:p>
+          </p:txBody>
+        </p:sp>
+        <p:sp>
+          <p:nvSpPr>
+            <p:cNvPr id="5" name="TextBox 4">
+              <a:extLst>
+                <a:ext uri="{FF2B5EF4-FFF2-40B4-BE49-F238E27FC236}">
+                  <a16:creationId xmlns:a16="http://schemas.microsoft.com/office/drawing/2014/main" id="{E8259EFC-4056-5411-4EF5-968B74C115D8}"/>
+                </a:ext>
+              </a:extLst>
+            </p:cNvPr>
+            <p:cNvSpPr txBox="1"/>
+            <p:nvPr/>
+          </p:nvSpPr>
+          <p:spPr>
+            <a:xfrm>
+              <a:off x="3847456" y="2593667"/>
+              <a:ext cx="1342099" cy="369332"/>
+            </a:xfrm>
+            <a:prstGeom prst="rect">
+              <a:avLst/>
+            </a:prstGeom>
+            <a:noFill/>
+            <a:ln>
+              <a:solidFill>
+                <a:schemeClr val="tx1"/>
+              </a:solidFill>
+            </a:ln>
+          </p:spPr>
+          <p:txBody>
+            <a:bodyPr wrap="none" rtlCol="0">
+              <a:spAutoFit/>
+            </a:bodyPr>
+            <a:lstStyle/>
+            <a:p>
+              <a:r>
+                <a:rPr lang="en-US" dirty="0"/>
+                <a:t>Quasigroup</a:t>
+              </a:r>
+            </a:p>
+          </p:txBody>
+        </p:sp>
+        <p:sp>
+          <p:nvSpPr>
+            <p:cNvPr id="6" name="TextBox 5">
+              <a:extLst>
+                <a:ext uri="{FF2B5EF4-FFF2-40B4-BE49-F238E27FC236}">
+                  <a16:creationId xmlns:a16="http://schemas.microsoft.com/office/drawing/2014/main" id="{2CEBCC6A-179A-8123-BF1D-9819A4A92C22}"/>
+                </a:ext>
+              </a:extLst>
+            </p:cNvPr>
+            <p:cNvSpPr txBox="1"/>
+            <p:nvPr/>
+          </p:nvSpPr>
+          <p:spPr>
+            <a:xfrm>
+              <a:off x="4178415" y="3384645"/>
+              <a:ext cx="683777" cy="369332"/>
+            </a:xfrm>
+            <a:prstGeom prst="rect">
+              <a:avLst/>
+            </a:prstGeom>
+            <a:noFill/>
+            <a:ln>
+              <a:solidFill>
+                <a:schemeClr val="tx1"/>
+              </a:solidFill>
+            </a:ln>
+          </p:spPr>
+          <p:txBody>
+            <a:bodyPr wrap="none" rtlCol="0">
+              <a:spAutoFit/>
+            </a:bodyPr>
+            <a:lstStyle/>
+            <a:p>
+              <a:r>
+                <a:rPr lang="en-US" dirty="0"/>
+                <a:t>Loop</a:t>
+              </a:r>
+            </a:p>
+          </p:txBody>
+        </p:sp>
+        <p:sp>
+          <p:nvSpPr>
+            <p:cNvPr id="7" name="TextBox 6">
+              <a:extLst>
+                <a:ext uri="{FF2B5EF4-FFF2-40B4-BE49-F238E27FC236}">
+                  <a16:creationId xmlns:a16="http://schemas.microsoft.com/office/drawing/2014/main" id="{1C65B7E7-E062-12FE-A2F4-A855A9337C95}"/>
+                </a:ext>
+              </a:extLst>
+            </p:cNvPr>
+            <p:cNvSpPr txBox="1"/>
+            <p:nvPr/>
+          </p:nvSpPr>
+          <p:spPr>
+            <a:xfrm>
+              <a:off x="5328020" y="2593667"/>
+              <a:ext cx="1258743" cy="369332"/>
+            </a:xfrm>
+            <a:prstGeom prst="rect">
+              <a:avLst/>
+            </a:prstGeom>
+            <a:noFill/>
+            <a:ln>
+              <a:solidFill>
+                <a:schemeClr val="tx1"/>
+              </a:solidFill>
+            </a:ln>
+          </p:spPr>
+          <p:txBody>
+            <a:bodyPr wrap="none" rtlCol="0">
+              <a:spAutoFit/>
+            </a:bodyPr>
+            <a:lstStyle/>
+            <a:p>
+              <a:r>
+                <a:rPr lang="en-US" dirty="0"/>
+                <a:t>Semigroup</a:t>
+              </a:r>
+            </a:p>
+          </p:txBody>
+        </p:sp>
+        <p:sp>
+          <p:nvSpPr>
+            <p:cNvPr id="8" name="TextBox 7">
+              <a:extLst>
+                <a:ext uri="{FF2B5EF4-FFF2-40B4-BE49-F238E27FC236}">
+                  <a16:creationId xmlns:a16="http://schemas.microsoft.com/office/drawing/2014/main" id="{6891AEFA-5C47-C68C-7ECA-2ACC9499EB57}"/>
+                </a:ext>
+              </a:extLst>
+            </p:cNvPr>
+            <p:cNvSpPr txBox="1"/>
+            <p:nvPr/>
+          </p:nvSpPr>
+          <p:spPr>
+            <a:xfrm>
+              <a:off x="5491561" y="3384645"/>
+              <a:ext cx="931665" cy="369332"/>
+            </a:xfrm>
+            <a:prstGeom prst="rect">
+              <a:avLst/>
+            </a:prstGeom>
+            <a:noFill/>
+            <a:ln>
+              <a:solidFill>
+                <a:schemeClr val="tx1"/>
+              </a:solidFill>
+            </a:ln>
+          </p:spPr>
+          <p:txBody>
+            <a:bodyPr wrap="none" rtlCol="0">
+              <a:spAutoFit/>
+            </a:bodyPr>
+            <a:lstStyle/>
+            <a:p>
+              <a:r>
+                <a:rPr lang="en-US" dirty="0"/>
+                <a:t>Monoid</a:t>
+              </a:r>
+            </a:p>
+          </p:txBody>
+        </p:sp>
+        <p:sp>
+          <p:nvSpPr>
+            <p:cNvPr id="9" name="TextBox 8">
+              <a:extLst>
+                <a:ext uri="{FF2B5EF4-FFF2-40B4-BE49-F238E27FC236}">
+                  <a16:creationId xmlns:a16="http://schemas.microsoft.com/office/drawing/2014/main" id="{D31DAA16-F6C2-E2BE-7B09-22EFF3D938BE}"/>
+                </a:ext>
+              </a:extLst>
+            </p:cNvPr>
+            <p:cNvSpPr txBox="1"/>
+            <p:nvPr/>
+          </p:nvSpPr>
+          <p:spPr>
+            <a:xfrm>
+              <a:off x="5554045" y="4175623"/>
+              <a:ext cx="806696" cy="369332"/>
+            </a:xfrm>
+            <a:prstGeom prst="rect">
+              <a:avLst/>
+            </a:prstGeom>
+            <a:noFill/>
+            <a:ln>
+              <a:solidFill>
+                <a:schemeClr val="tx1"/>
+              </a:solidFill>
+            </a:ln>
+          </p:spPr>
+          <p:txBody>
+            <a:bodyPr wrap="none" rtlCol="0">
+              <a:spAutoFit/>
+            </a:bodyPr>
+            <a:lstStyle/>
+            <a:p>
+              <a:r>
+                <a:rPr lang="en-US" dirty="0"/>
+                <a:t>Group</a:t>
+              </a:r>
+            </a:p>
+          </p:txBody>
+        </p:sp>
+        <p:sp>
+          <p:nvSpPr>
+            <p:cNvPr id="10" name="TextBox 9">
+              <a:extLst>
+                <a:ext uri="{FF2B5EF4-FFF2-40B4-BE49-F238E27FC236}">
+                  <a16:creationId xmlns:a16="http://schemas.microsoft.com/office/drawing/2014/main" id="{FD8B4685-A99D-5EB4-3B54-0544F7F37761}"/>
+                </a:ext>
+              </a:extLst>
+            </p:cNvPr>
+            <p:cNvSpPr txBox="1"/>
+            <p:nvPr/>
+          </p:nvSpPr>
+          <p:spPr>
+            <a:xfrm>
+              <a:off x="5648654" y="4781935"/>
+              <a:ext cx="617477" cy="369332"/>
+            </a:xfrm>
+            <a:prstGeom prst="rect">
+              <a:avLst/>
+            </a:prstGeom>
+            <a:noFill/>
+            <a:ln>
+              <a:solidFill>
+                <a:schemeClr val="tx1"/>
+              </a:solidFill>
+            </a:ln>
+          </p:spPr>
+          <p:txBody>
+            <a:bodyPr wrap="none" rtlCol="0">
+              <a:spAutoFit/>
+            </a:bodyPr>
+            <a:lstStyle/>
+            <a:p>
+              <a:r>
+                <a:rPr lang="en-US" dirty="0"/>
+                <a:t>Ring</a:t>
+              </a:r>
+            </a:p>
+          </p:txBody>
+        </p:sp>
+        <p:sp>
+          <p:nvSpPr>
+            <p:cNvPr id="11" name="TextBox 10">
+              <a:extLst>
+                <a:ext uri="{FF2B5EF4-FFF2-40B4-BE49-F238E27FC236}">
+                  <a16:creationId xmlns:a16="http://schemas.microsoft.com/office/drawing/2014/main" id="{88398D69-96EF-3CDD-37CA-D04733891D7A}"/>
+                </a:ext>
+              </a:extLst>
+            </p:cNvPr>
+            <p:cNvSpPr txBox="1"/>
+            <p:nvPr/>
+          </p:nvSpPr>
+          <p:spPr>
+            <a:xfrm>
+              <a:off x="5623134" y="5388247"/>
+              <a:ext cx="668516" cy="369332"/>
+            </a:xfrm>
+            <a:prstGeom prst="rect">
+              <a:avLst/>
+            </a:prstGeom>
+            <a:noFill/>
+            <a:ln>
+              <a:solidFill>
+                <a:schemeClr val="tx1"/>
+              </a:solidFill>
+            </a:ln>
+          </p:spPr>
+          <p:txBody>
+            <a:bodyPr wrap="none" rtlCol="0">
+              <a:spAutoFit/>
+            </a:bodyPr>
+            <a:lstStyle/>
+            <a:p>
+              <a:r>
+                <a:rPr lang="en-US" dirty="0"/>
+                <a:t>Field</a:t>
+              </a:r>
+            </a:p>
+          </p:txBody>
+        </p:sp>
+        <p:sp>
+          <p:nvSpPr>
+            <p:cNvPr id="12" name="TextBox 11">
+              <a:extLst>
+                <a:ext uri="{FF2B5EF4-FFF2-40B4-BE49-F238E27FC236}">
+                  <a16:creationId xmlns:a16="http://schemas.microsoft.com/office/drawing/2014/main" id="{D57EDEC3-C8B4-DDFE-66D8-C217A4A65813}"/>
+                </a:ext>
+              </a:extLst>
+            </p:cNvPr>
+            <p:cNvSpPr txBox="1"/>
+            <p:nvPr/>
+          </p:nvSpPr>
+          <p:spPr>
+            <a:xfrm>
+              <a:off x="7486487" y="5203581"/>
+              <a:ext cx="1457707" cy="369332"/>
+            </a:xfrm>
+            <a:prstGeom prst="rect">
+              <a:avLst/>
+            </a:prstGeom>
+            <a:noFill/>
+            <a:ln>
+              <a:solidFill>
+                <a:schemeClr val="tx1"/>
+              </a:solidFill>
+            </a:ln>
+          </p:spPr>
+          <p:txBody>
+            <a:bodyPr wrap="none" rtlCol="0">
+              <a:spAutoFit/>
+            </a:bodyPr>
+            <a:lstStyle/>
+            <a:p>
+              <a:r>
+                <a:rPr lang="en-US" dirty="0" err="1"/>
+                <a:t>VectorSpace</a:t>
+              </a:r>
+              <a:endParaRPr lang="en-US" dirty="0"/>
+            </a:p>
+          </p:txBody>
+        </p:sp>
+        <p:sp>
+          <p:nvSpPr>
+            <p:cNvPr id="13" name="TextBox 12">
+              <a:extLst>
+                <a:ext uri="{FF2B5EF4-FFF2-40B4-BE49-F238E27FC236}">
+                  <a16:creationId xmlns:a16="http://schemas.microsoft.com/office/drawing/2014/main" id="{BE940B4E-7487-C9AF-63D4-6ECAE4D08D51}"/>
+                </a:ext>
+              </a:extLst>
+            </p:cNvPr>
+            <p:cNvSpPr txBox="1"/>
+            <p:nvPr/>
+          </p:nvSpPr>
+          <p:spPr>
+            <a:xfrm>
+              <a:off x="7748707" y="4412603"/>
+              <a:ext cx="933269" cy="369332"/>
+            </a:xfrm>
+            <a:prstGeom prst="rect">
+              <a:avLst/>
+            </a:prstGeom>
+            <a:noFill/>
+            <a:ln>
+              <a:solidFill>
+                <a:schemeClr val="tx1"/>
+              </a:solidFill>
+            </a:ln>
+          </p:spPr>
+          <p:txBody>
+            <a:bodyPr wrap="none" rtlCol="0">
+              <a:spAutoFit/>
+            </a:bodyPr>
+            <a:lstStyle/>
+            <a:p>
+              <a:r>
+                <a:rPr lang="en-US" dirty="0"/>
+                <a:t>Module</a:t>
+              </a:r>
+            </a:p>
+          </p:txBody>
+        </p:sp>
+        <p:cxnSp>
+          <p:nvCxnSpPr>
+            <p:cNvPr id="15" name="Straight Arrow Connector 14">
+              <a:extLst>
+                <a:ext uri="{FF2B5EF4-FFF2-40B4-BE49-F238E27FC236}">
+                  <a16:creationId xmlns:a16="http://schemas.microsoft.com/office/drawing/2014/main" id="{336C84C1-B936-3CD9-C4C7-32AE98B503FE}"/>
+                </a:ext>
+              </a:extLst>
+            </p:cNvPr>
+            <p:cNvCxnSpPr>
+              <a:stCxn id="4" idx="2"/>
+              <a:endCxn id="5" idx="0"/>
+            </p:cNvCxnSpPr>
+            <p:nvPr/>
+          </p:nvCxnSpPr>
+          <p:spPr>
+            <a:xfrm flipH="1">
+              <a:off x="4518506" y="2013512"/>
+              <a:ext cx="674867" cy="580155"/>
+            </a:xfrm>
+            <a:prstGeom prst="straightConnector1">
+              <a:avLst/>
+            </a:prstGeom>
+            <a:ln>
+              <a:tailEnd type="triangle"/>
+            </a:ln>
+          </p:spPr>
+          <p:style>
+            <a:lnRef idx="2">
+              <a:schemeClr val="accent1"/>
+            </a:lnRef>
+            <a:fillRef idx="0">
+              <a:schemeClr val="accent1"/>
+            </a:fillRef>
+            <a:effectRef idx="1">
+              <a:schemeClr val="accent1"/>
+            </a:effectRef>
+            <a:fontRef idx="minor">
               <a:schemeClr val="tx1"/>
-            </a:solidFill>
-          </a:ln>
-        </p:spPr>
-        <p:txBody>
-          <a:bodyPr wrap="none" rtlCol="0">
-            <a:spAutoFit/>
-          </a:bodyPr>
-          <a:lstStyle/>
-          <a:p>
-            <a:r>
-              <a:rPr lang="en-US" dirty="0"/>
-              <a:t>Magma</a:t>
-            </a:r>
-          </a:p>
-        </p:txBody>
-      </p:sp>
-      <p:sp>
-        <p:nvSpPr>
-          <p:cNvPr id="5" name="TextBox 4">
-            <a:extLst>
-              <a:ext uri="{FF2B5EF4-FFF2-40B4-BE49-F238E27FC236}">
-                <a16:creationId xmlns:a16="http://schemas.microsoft.com/office/drawing/2014/main" id="{E8259EFC-4056-5411-4EF5-968B74C115D8}"/>
-              </a:ext>
-            </a:extLst>
-          </p:cNvPr>
-          <p:cNvSpPr txBox="1"/>
-          <p:nvPr/>
-        </p:nvSpPr>
-        <p:spPr>
-          <a:xfrm>
-            <a:off x="3268303" y="2358763"/>
-            <a:ext cx="1342099" cy="369332"/>
-          </a:xfrm>
-          <a:prstGeom prst="rect">
-            <a:avLst/>
-          </a:prstGeom>
-          <a:noFill/>
-          <a:ln>
-            <a:solidFill>
+            </a:fontRef>
+          </p:style>
+        </p:cxnSp>
+        <p:cxnSp>
+          <p:nvCxnSpPr>
+            <p:cNvPr id="17" name="Straight Arrow Connector 16">
+              <a:extLst>
+                <a:ext uri="{FF2B5EF4-FFF2-40B4-BE49-F238E27FC236}">
+                  <a16:creationId xmlns:a16="http://schemas.microsoft.com/office/drawing/2014/main" id="{B37F10B1-A918-6EA5-537A-A42D84DA110C}"/>
+                </a:ext>
+              </a:extLst>
+            </p:cNvPr>
+            <p:cNvCxnSpPr>
+              <a:stCxn id="4" idx="2"/>
+              <a:endCxn id="7" idx="0"/>
+            </p:cNvCxnSpPr>
+            <p:nvPr/>
+          </p:nvCxnSpPr>
+          <p:spPr>
+            <a:xfrm>
+              <a:off x="5193373" y="2013512"/>
+              <a:ext cx="764019" cy="580155"/>
+            </a:xfrm>
+            <a:prstGeom prst="straightConnector1">
+              <a:avLst/>
+            </a:prstGeom>
+            <a:ln>
+              <a:tailEnd type="triangle"/>
+            </a:ln>
+          </p:spPr>
+          <p:style>
+            <a:lnRef idx="2">
+              <a:schemeClr val="accent1"/>
+            </a:lnRef>
+            <a:fillRef idx="0">
+              <a:schemeClr val="accent1"/>
+            </a:fillRef>
+            <a:effectRef idx="1">
+              <a:schemeClr val="accent1"/>
+            </a:effectRef>
+            <a:fontRef idx="minor">
               <a:schemeClr val="tx1"/>
-            </a:solidFill>
-          </a:ln>
-        </p:spPr>
-        <p:txBody>
-          <a:bodyPr wrap="none" rtlCol="0">
-            <a:spAutoFit/>
-          </a:bodyPr>
-          <a:lstStyle/>
-          <a:p>
-            <a:r>
-              <a:rPr lang="en-US" dirty="0"/>
-              <a:t>Quasigroup</a:t>
-            </a:r>
-          </a:p>
-        </p:txBody>
-      </p:sp>
-      <p:sp>
-        <p:nvSpPr>
-          <p:cNvPr id="6" name="TextBox 5">
-            <a:extLst>
-              <a:ext uri="{FF2B5EF4-FFF2-40B4-BE49-F238E27FC236}">
-                <a16:creationId xmlns:a16="http://schemas.microsoft.com/office/drawing/2014/main" id="{2CEBCC6A-179A-8123-BF1D-9819A4A92C22}"/>
-              </a:ext>
-            </a:extLst>
-          </p:cNvPr>
-          <p:cNvSpPr txBox="1"/>
-          <p:nvPr/>
-        </p:nvSpPr>
-        <p:spPr>
-          <a:xfrm>
-            <a:off x="3599262" y="3149741"/>
-            <a:ext cx="683777" cy="369332"/>
-          </a:xfrm>
-          <a:prstGeom prst="rect">
-            <a:avLst/>
-          </a:prstGeom>
-          <a:noFill/>
-          <a:ln>
-            <a:solidFill>
+            </a:fontRef>
+          </p:style>
+        </p:cxnSp>
+        <p:cxnSp>
+          <p:nvCxnSpPr>
+            <p:cNvPr id="19" name="Straight Arrow Connector 18">
+              <a:extLst>
+                <a:ext uri="{FF2B5EF4-FFF2-40B4-BE49-F238E27FC236}">
+                  <a16:creationId xmlns:a16="http://schemas.microsoft.com/office/drawing/2014/main" id="{BA601927-E942-9A76-95A0-602E3C979347}"/>
+                </a:ext>
+              </a:extLst>
+            </p:cNvPr>
+            <p:cNvCxnSpPr>
+              <a:stCxn id="5" idx="2"/>
+              <a:endCxn id="6" idx="0"/>
+            </p:cNvCxnSpPr>
+            <p:nvPr/>
+          </p:nvCxnSpPr>
+          <p:spPr>
+            <a:xfrm>
+              <a:off x="4518506" y="2962999"/>
+              <a:ext cx="1798" cy="421646"/>
+            </a:xfrm>
+            <a:prstGeom prst="straightConnector1">
+              <a:avLst/>
+            </a:prstGeom>
+            <a:ln>
+              <a:tailEnd type="triangle"/>
+            </a:ln>
+          </p:spPr>
+          <p:style>
+            <a:lnRef idx="2">
+              <a:schemeClr val="accent1"/>
+            </a:lnRef>
+            <a:fillRef idx="0">
+              <a:schemeClr val="accent1"/>
+            </a:fillRef>
+            <a:effectRef idx="1">
+              <a:schemeClr val="accent1"/>
+            </a:effectRef>
+            <a:fontRef idx="minor">
               <a:schemeClr val="tx1"/>
-            </a:solidFill>
-          </a:ln>
-        </p:spPr>
-        <p:txBody>
-          <a:bodyPr wrap="none" rtlCol="0">
-            <a:spAutoFit/>
-          </a:bodyPr>
-          <a:lstStyle/>
-          <a:p>
-            <a:r>
-              <a:rPr lang="en-US" dirty="0"/>
-              <a:t>Loop</a:t>
-            </a:r>
-          </a:p>
-        </p:txBody>
-      </p:sp>
-      <p:sp>
-        <p:nvSpPr>
-          <p:cNvPr id="7" name="TextBox 6">
-            <a:extLst>
-              <a:ext uri="{FF2B5EF4-FFF2-40B4-BE49-F238E27FC236}">
-                <a16:creationId xmlns:a16="http://schemas.microsoft.com/office/drawing/2014/main" id="{1C65B7E7-E062-12FE-A2F4-A855A9337C95}"/>
-              </a:ext>
-            </a:extLst>
-          </p:cNvPr>
-          <p:cNvSpPr txBox="1"/>
-          <p:nvPr/>
-        </p:nvSpPr>
-        <p:spPr>
-          <a:xfrm>
-            <a:off x="4748867" y="2358763"/>
-            <a:ext cx="1258743" cy="369332"/>
-          </a:xfrm>
-          <a:prstGeom prst="rect">
-            <a:avLst/>
-          </a:prstGeom>
-          <a:noFill/>
-          <a:ln>
-            <a:solidFill>
+            </a:fontRef>
+          </p:style>
+        </p:cxnSp>
+        <p:cxnSp>
+          <p:nvCxnSpPr>
+            <p:cNvPr id="21" name="Straight Arrow Connector 20">
+              <a:extLst>
+                <a:ext uri="{FF2B5EF4-FFF2-40B4-BE49-F238E27FC236}">
+                  <a16:creationId xmlns:a16="http://schemas.microsoft.com/office/drawing/2014/main" id="{AF48B7B4-7012-1658-DA5D-0E7C960F8227}"/>
+                </a:ext>
+              </a:extLst>
+            </p:cNvPr>
+            <p:cNvCxnSpPr>
+              <a:stCxn id="7" idx="2"/>
+              <a:endCxn id="8" idx="0"/>
+            </p:cNvCxnSpPr>
+            <p:nvPr/>
+          </p:nvCxnSpPr>
+          <p:spPr>
+            <a:xfrm>
+              <a:off x="5957392" y="2962999"/>
+              <a:ext cx="2" cy="421646"/>
+            </a:xfrm>
+            <a:prstGeom prst="straightConnector1">
+              <a:avLst/>
+            </a:prstGeom>
+            <a:ln>
+              <a:tailEnd type="triangle"/>
+            </a:ln>
+          </p:spPr>
+          <p:style>
+            <a:lnRef idx="2">
+              <a:schemeClr val="accent1"/>
+            </a:lnRef>
+            <a:fillRef idx="0">
+              <a:schemeClr val="accent1"/>
+            </a:fillRef>
+            <a:effectRef idx="1">
+              <a:schemeClr val="accent1"/>
+            </a:effectRef>
+            <a:fontRef idx="minor">
               <a:schemeClr val="tx1"/>
-            </a:solidFill>
-          </a:ln>
-        </p:spPr>
-        <p:txBody>
-          <a:bodyPr wrap="none" rtlCol="0">
-            <a:spAutoFit/>
-          </a:bodyPr>
-          <a:lstStyle/>
-          <a:p>
-            <a:r>
-              <a:rPr lang="en-US" dirty="0"/>
-              <a:t>Semigroup</a:t>
-            </a:r>
-          </a:p>
-        </p:txBody>
-      </p:sp>
-      <p:sp>
-        <p:nvSpPr>
-          <p:cNvPr id="8" name="TextBox 7">
-            <a:extLst>
-              <a:ext uri="{FF2B5EF4-FFF2-40B4-BE49-F238E27FC236}">
-                <a16:creationId xmlns:a16="http://schemas.microsoft.com/office/drawing/2014/main" id="{6891AEFA-5C47-C68C-7ECA-2ACC9499EB57}"/>
-              </a:ext>
-            </a:extLst>
-          </p:cNvPr>
-          <p:cNvSpPr txBox="1"/>
-          <p:nvPr/>
-        </p:nvSpPr>
-        <p:spPr>
-          <a:xfrm>
-            <a:off x="4912408" y="3149741"/>
-            <a:ext cx="931665" cy="369332"/>
-          </a:xfrm>
-          <a:prstGeom prst="rect">
-            <a:avLst/>
-          </a:prstGeom>
-          <a:noFill/>
-          <a:ln>
-            <a:solidFill>
+            </a:fontRef>
+          </p:style>
+        </p:cxnSp>
+        <p:cxnSp>
+          <p:nvCxnSpPr>
+            <p:cNvPr id="23" name="Straight Arrow Connector 22">
+              <a:extLst>
+                <a:ext uri="{FF2B5EF4-FFF2-40B4-BE49-F238E27FC236}">
+                  <a16:creationId xmlns:a16="http://schemas.microsoft.com/office/drawing/2014/main" id="{90F7E948-D73A-9E48-A473-25027EB4CD58}"/>
+                </a:ext>
+              </a:extLst>
+            </p:cNvPr>
+            <p:cNvCxnSpPr>
+              <a:stCxn id="8" idx="2"/>
+              <a:endCxn id="9" idx="0"/>
+            </p:cNvCxnSpPr>
+            <p:nvPr/>
+          </p:nvCxnSpPr>
+          <p:spPr>
+            <a:xfrm flipH="1">
+              <a:off x="5957393" y="3753977"/>
+              <a:ext cx="1" cy="421646"/>
+            </a:xfrm>
+            <a:prstGeom prst="straightConnector1">
+              <a:avLst/>
+            </a:prstGeom>
+            <a:ln>
+              <a:tailEnd type="triangle"/>
+            </a:ln>
+          </p:spPr>
+          <p:style>
+            <a:lnRef idx="2">
+              <a:schemeClr val="accent1"/>
+            </a:lnRef>
+            <a:fillRef idx="0">
+              <a:schemeClr val="accent1"/>
+            </a:fillRef>
+            <a:effectRef idx="1">
+              <a:schemeClr val="accent1"/>
+            </a:effectRef>
+            <a:fontRef idx="minor">
               <a:schemeClr val="tx1"/>
-            </a:solidFill>
-          </a:ln>
-        </p:spPr>
-        <p:txBody>
-          <a:bodyPr wrap="none" rtlCol="0">
-            <a:spAutoFit/>
-          </a:bodyPr>
-          <a:lstStyle/>
-          <a:p>
-            <a:r>
-              <a:rPr lang="en-US" dirty="0"/>
-              <a:t>Monoid</a:t>
-            </a:r>
-          </a:p>
-        </p:txBody>
-      </p:sp>
-      <p:sp>
-        <p:nvSpPr>
-          <p:cNvPr id="9" name="TextBox 8">
-            <a:extLst>
-              <a:ext uri="{FF2B5EF4-FFF2-40B4-BE49-F238E27FC236}">
-                <a16:creationId xmlns:a16="http://schemas.microsoft.com/office/drawing/2014/main" id="{D31DAA16-F6C2-E2BE-7B09-22EFF3D938BE}"/>
-              </a:ext>
-            </a:extLst>
-          </p:cNvPr>
-          <p:cNvSpPr txBox="1"/>
-          <p:nvPr/>
-        </p:nvSpPr>
-        <p:spPr>
-          <a:xfrm>
-            <a:off x="4974892" y="3940719"/>
-            <a:ext cx="806696" cy="369332"/>
-          </a:xfrm>
-          <a:prstGeom prst="rect">
-            <a:avLst/>
-          </a:prstGeom>
-          <a:noFill/>
-          <a:ln>
-            <a:solidFill>
+            </a:fontRef>
+          </p:style>
+        </p:cxnSp>
+        <p:cxnSp>
+          <p:nvCxnSpPr>
+            <p:cNvPr id="25" name="Straight Arrow Connector 24">
+              <a:extLst>
+                <a:ext uri="{FF2B5EF4-FFF2-40B4-BE49-F238E27FC236}">
+                  <a16:creationId xmlns:a16="http://schemas.microsoft.com/office/drawing/2014/main" id="{4998AF41-4797-0FE8-A46B-E800CD91EA3B}"/>
+                </a:ext>
+              </a:extLst>
+            </p:cNvPr>
+            <p:cNvCxnSpPr>
+              <a:stCxn id="9" idx="2"/>
+              <a:endCxn id="10" idx="0"/>
+            </p:cNvCxnSpPr>
+            <p:nvPr/>
+          </p:nvCxnSpPr>
+          <p:spPr>
+            <a:xfrm>
+              <a:off x="5957393" y="4544955"/>
+              <a:ext cx="0" cy="236980"/>
+            </a:xfrm>
+            <a:prstGeom prst="straightConnector1">
+              <a:avLst/>
+            </a:prstGeom>
+            <a:ln>
+              <a:tailEnd type="triangle"/>
+            </a:ln>
+          </p:spPr>
+          <p:style>
+            <a:lnRef idx="2">
+              <a:schemeClr val="accent1"/>
+            </a:lnRef>
+            <a:fillRef idx="0">
+              <a:schemeClr val="accent1"/>
+            </a:fillRef>
+            <a:effectRef idx="1">
+              <a:schemeClr val="accent1"/>
+            </a:effectRef>
+            <a:fontRef idx="minor">
               <a:schemeClr val="tx1"/>
-            </a:solidFill>
-          </a:ln>
-        </p:spPr>
-        <p:txBody>
-          <a:bodyPr wrap="none" rtlCol="0">
-            <a:spAutoFit/>
-          </a:bodyPr>
-          <a:lstStyle/>
-          <a:p>
-            <a:r>
-              <a:rPr lang="en-US" dirty="0"/>
-              <a:t>Group</a:t>
-            </a:r>
-          </a:p>
-        </p:txBody>
-      </p:sp>
-      <p:sp>
-        <p:nvSpPr>
-          <p:cNvPr id="10" name="TextBox 9">
-            <a:extLst>
-              <a:ext uri="{FF2B5EF4-FFF2-40B4-BE49-F238E27FC236}">
-                <a16:creationId xmlns:a16="http://schemas.microsoft.com/office/drawing/2014/main" id="{FD8B4685-A99D-5EB4-3B54-0544F7F37761}"/>
-              </a:ext>
-            </a:extLst>
-          </p:cNvPr>
-          <p:cNvSpPr txBox="1"/>
-          <p:nvPr/>
-        </p:nvSpPr>
-        <p:spPr>
-          <a:xfrm>
-            <a:off x="5069501" y="4547031"/>
-            <a:ext cx="617477" cy="369332"/>
-          </a:xfrm>
-          <a:prstGeom prst="rect">
-            <a:avLst/>
-          </a:prstGeom>
-          <a:noFill/>
-          <a:ln>
-            <a:solidFill>
+            </a:fontRef>
+          </p:style>
+        </p:cxnSp>
+        <p:cxnSp>
+          <p:nvCxnSpPr>
+            <p:cNvPr id="27" name="Straight Arrow Connector 26">
+              <a:extLst>
+                <a:ext uri="{FF2B5EF4-FFF2-40B4-BE49-F238E27FC236}">
+                  <a16:creationId xmlns:a16="http://schemas.microsoft.com/office/drawing/2014/main" id="{4DBC1D45-9EBD-818A-03A9-259B0C475CD4}"/>
+                </a:ext>
+              </a:extLst>
+            </p:cNvPr>
+            <p:cNvCxnSpPr>
+              <a:stCxn id="10" idx="2"/>
+              <a:endCxn id="11" idx="0"/>
+            </p:cNvCxnSpPr>
+            <p:nvPr/>
+          </p:nvCxnSpPr>
+          <p:spPr>
+            <a:xfrm flipH="1">
+              <a:off x="5957392" y="5151267"/>
+              <a:ext cx="1" cy="236980"/>
+            </a:xfrm>
+            <a:prstGeom prst="straightConnector1">
+              <a:avLst/>
+            </a:prstGeom>
+            <a:ln>
+              <a:tailEnd type="triangle"/>
+            </a:ln>
+          </p:spPr>
+          <p:style>
+            <a:lnRef idx="2">
+              <a:schemeClr val="accent1"/>
+            </a:lnRef>
+            <a:fillRef idx="0">
+              <a:schemeClr val="accent1"/>
+            </a:fillRef>
+            <a:effectRef idx="1">
+              <a:schemeClr val="accent1"/>
+            </a:effectRef>
+            <a:fontRef idx="minor">
               <a:schemeClr val="tx1"/>
-            </a:solidFill>
-          </a:ln>
-        </p:spPr>
-        <p:txBody>
-          <a:bodyPr wrap="none" rtlCol="0">
-            <a:spAutoFit/>
-          </a:bodyPr>
-          <a:lstStyle/>
-          <a:p>
-            <a:r>
-              <a:rPr lang="en-US" dirty="0"/>
-              <a:t>Ring</a:t>
-            </a:r>
-          </a:p>
-        </p:txBody>
-      </p:sp>
-      <p:sp>
-        <p:nvSpPr>
-          <p:cNvPr id="11" name="TextBox 10">
-            <a:extLst>
-              <a:ext uri="{FF2B5EF4-FFF2-40B4-BE49-F238E27FC236}">
-                <a16:creationId xmlns:a16="http://schemas.microsoft.com/office/drawing/2014/main" id="{88398D69-96EF-3CDD-37CA-D04733891D7A}"/>
-              </a:ext>
-            </a:extLst>
-          </p:cNvPr>
-          <p:cNvSpPr txBox="1"/>
-          <p:nvPr/>
-        </p:nvSpPr>
-        <p:spPr>
-          <a:xfrm>
-            <a:off x="5043981" y="5153343"/>
-            <a:ext cx="668516" cy="369332"/>
-          </a:xfrm>
-          <a:prstGeom prst="rect">
-            <a:avLst/>
-          </a:prstGeom>
-          <a:noFill/>
-          <a:ln>
-            <a:solidFill>
+            </a:fontRef>
+          </p:style>
+        </p:cxnSp>
+        <p:sp>
+          <p:nvSpPr>
+            <p:cNvPr id="59" name="TextBox 58">
+              <a:extLst>
+                <a:ext uri="{FF2B5EF4-FFF2-40B4-BE49-F238E27FC236}">
+                  <a16:creationId xmlns:a16="http://schemas.microsoft.com/office/drawing/2014/main" id="{03ED8F1A-9E81-D654-849D-9B198A0BB3FB}"/>
+                </a:ext>
+              </a:extLst>
+            </p:cNvPr>
+            <p:cNvSpPr txBox="1"/>
+            <p:nvPr/>
+          </p:nvSpPr>
+          <p:spPr>
+            <a:xfrm>
+              <a:off x="9359684" y="5065081"/>
+              <a:ext cx="1609736" cy="646331"/>
+            </a:xfrm>
+            <a:prstGeom prst="rect">
+              <a:avLst/>
+            </a:prstGeom>
+            <a:noFill/>
+            <a:ln>
+              <a:solidFill>
+                <a:schemeClr val="tx1"/>
+              </a:solidFill>
+            </a:ln>
+          </p:spPr>
+          <p:txBody>
+            <a:bodyPr wrap="none" rtlCol="0">
+              <a:spAutoFit/>
+            </a:bodyPr>
+            <a:lstStyle/>
+            <a:p>
+              <a:pPr algn="ctr"/>
+              <a:r>
+                <a:rPr lang="en-US" dirty="0" err="1"/>
+                <a:t>Ndimensional</a:t>
+              </a:r>
+              <a:endParaRPr lang="en-US" dirty="0"/>
+            </a:p>
+            <a:p>
+              <a:pPr algn="ctr"/>
+              <a:r>
+                <a:rPr lang="en-US" dirty="0" err="1"/>
+                <a:t>VectorSpace</a:t>
+              </a:r>
+              <a:endParaRPr lang="en-US" dirty="0"/>
+            </a:p>
+          </p:txBody>
+        </p:sp>
+        <p:sp>
+          <p:nvSpPr>
+            <p:cNvPr id="60" name="TextBox 59">
+              <a:extLst>
+                <a:ext uri="{FF2B5EF4-FFF2-40B4-BE49-F238E27FC236}">
+                  <a16:creationId xmlns:a16="http://schemas.microsoft.com/office/drawing/2014/main" id="{EA094043-AD46-F541-59E0-A321B7DF1BD4}"/>
+                </a:ext>
+              </a:extLst>
+            </p:cNvPr>
+            <p:cNvSpPr txBox="1"/>
+            <p:nvPr/>
+          </p:nvSpPr>
+          <p:spPr>
+            <a:xfrm>
+              <a:off x="9359684" y="4274103"/>
+              <a:ext cx="1609736" cy="646331"/>
+            </a:xfrm>
+            <a:prstGeom prst="rect">
+              <a:avLst/>
+            </a:prstGeom>
+            <a:noFill/>
+            <a:ln>
+              <a:solidFill>
+                <a:schemeClr val="tx1"/>
+              </a:solidFill>
+            </a:ln>
+          </p:spPr>
+          <p:txBody>
+            <a:bodyPr wrap="none" rtlCol="0">
+              <a:spAutoFit/>
+            </a:bodyPr>
+            <a:lstStyle/>
+            <a:p>
+              <a:pPr algn="ctr"/>
+              <a:r>
+                <a:rPr lang="en-US" dirty="0" err="1"/>
+                <a:t>Ndimensional</a:t>
+              </a:r>
+              <a:endParaRPr lang="en-US" dirty="0"/>
+            </a:p>
+            <a:p>
+              <a:pPr algn="ctr"/>
+              <a:r>
+                <a:rPr lang="en-US" dirty="0"/>
+                <a:t>Module</a:t>
+              </a:r>
+            </a:p>
+          </p:txBody>
+        </p:sp>
+        <p:sp>
+          <p:nvSpPr>
+            <p:cNvPr id="66" name="TextBox 65">
+              <a:extLst>
+                <a:ext uri="{FF2B5EF4-FFF2-40B4-BE49-F238E27FC236}">
+                  <a16:creationId xmlns:a16="http://schemas.microsoft.com/office/drawing/2014/main" id="{1BA71155-84A6-8C5B-24AD-EDD59340EE69}"/>
+                </a:ext>
+              </a:extLst>
+            </p:cNvPr>
+            <p:cNvSpPr txBox="1"/>
+            <p:nvPr/>
+          </p:nvSpPr>
+          <p:spPr>
+            <a:xfrm>
+              <a:off x="5554045" y="2101224"/>
+              <a:ext cx="1144993" cy="307777"/>
+            </a:xfrm>
+            <a:prstGeom prst="rect">
+              <a:avLst/>
+            </a:prstGeom>
+            <a:noFill/>
+          </p:spPr>
+          <p:txBody>
+            <a:bodyPr wrap="none" rtlCol="0">
+              <a:spAutoFit/>
+            </a:bodyPr>
+            <a:lstStyle/>
+            <a:p>
+              <a:r>
+                <a:rPr lang="en-US" sz="1400" i="1" dirty="0"/>
+                <a:t>associativity</a:t>
+              </a:r>
+            </a:p>
+          </p:txBody>
+        </p:sp>
+        <p:sp>
+          <p:nvSpPr>
+            <p:cNvPr id="67" name="TextBox 66">
+              <a:extLst>
+                <a:ext uri="{FF2B5EF4-FFF2-40B4-BE49-F238E27FC236}">
+                  <a16:creationId xmlns:a16="http://schemas.microsoft.com/office/drawing/2014/main" id="{CDCCDBBD-3F46-8164-93B4-B91F38E89FB7}"/>
+                </a:ext>
+              </a:extLst>
+            </p:cNvPr>
+            <p:cNvSpPr txBox="1"/>
+            <p:nvPr/>
+          </p:nvSpPr>
+          <p:spPr>
+            <a:xfrm>
+              <a:off x="5947010" y="3012322"/>
+              <a:ext cx="758669" cy="307777"/>
+            </a:xfrm>
+            <a:prstGeom prst="rect">
+              <a:avLst/>
+            </a:prstGeom>
+            <a:noFill/>
+          </p:spPr>
+          <p:txBody>
+            <a:bodyPr wrap="none" rtlCol="0">
+              <a:spAutoFit/>
+            </a:bodyPr>
+            <a:lstStyle/>
+            <a:p>
+              <a:r>
+                <a:rPr lang="en-US" sz="1400" i="1" dirty="0"/>
+                <a:t>identity</a:t>
+              </a:r>
+            </a:p>
+          </p:txBody>
+        </p:sp>
+        <p:sp>
+          <p:nvSpPr>
+            <p:cNvPr id="68" name="TextBox 67">
+              <a:extLst>
+                <a:ext uri="{FF2B5EF4-FFF2-40B4-BE49-F238E27FC236}">
+                  <a16:creationId xmlns:a16="http://schemas.microsoft.com/office/drawing/2014/main" id="{565344A0-D795-1F9A-9DC7-A6AED118EF96}"/>
+                </a:ext>
+              </a:extLst>
+            </p:cNvPr>
+            <p:cNvSpPr txBox="1"/>
+            <p:nvPr/>
+          </p:nvSpPr>
+          <p:spPr>
+            <a:xfrm>
+              <a:off x="3779254" y="3012322"/>
+              <a:ext cx="758669" cy="307777"/>
+            </a:xfrm>
+            <a:prstGeom prst="rect">
+              <a:avLst/>
+            </a:prstGeom>
+            <a:noFill/>
+          </p:spPr>
+          <p:txBody>
+            <a:bodyPr wrap="none" rtlCol="0">
+              <a:spAutoFit/>
+            </a:bodyPr>
+            <a:lstStyle/>
+            <a:p>
+              <a:r>
+                <a:rPr lang="en-US" sz="1400" i="1" dirty="0"/>
+                <a:t>identity</a:t>
+              </a:r>
+            </a:p>
+          </p:txBody>
+        </p:sp>
+        <p:sp>
+          <p:nvSpPr>
+            <p:cNvPr id="69" name="TextBox 68">
+              <a:extLst>
+                <a:ext uri="{FF2B5EF4-FFF2-40B4-BE49-F238E27FC236}">
+                  <a16:creationId xmlns:a16="http://schemas.microsoft.com/office/drawing/2014/main" id="{6B21F4B4-E597-BDBE-C624-3E3E45EBDC09}"/>
+                </a:ext>
+              </a:extLst>
+            </p:cNvPr>
+            <p:cNvSpPr txBox="1"/>
+            <p:nvPr/>
+          </p:nvSpPr>
+          <p:spPr>
+            <a:xfrm>
+              <a:off x="5969681" y="3805809"/>
+              <a:ext cx="1027845" cy="307777"/>
+            </a:xfrm>
+            <a:prstGeom prst="rect">
+              <a:avLst/>
+            </a:prstGeom>
+            <a:noFill/>
+          </p:spPr>
+          <p:txBody>
+            <a:bodyPr wrap="none" rtlCol="0">
+              <a:spAutoFit/>
+            </a:bodyPr>
+            <a:lstStyle/>
+            <a:p>
+              <a:r>
+                <a:rPr lang="en-US" sz="1400" i="1" dirty="0"/>
+                <a:t>invertibility</a:t>
+              </a:r>
+            </a:p>
+          </p:txBody>
+        </p:sp>
+        <p:sp>
+          <p:nvSpPr>
+            <p:cNvPr id="70" name="TextBox 69">
+              <a:extLst>
+                <a:ext uri="{FF2B5EF4-FFF2-40B4-BE49-F238E27FC236}">
+                  <a16:creationId xmlns:a16="http://schemas.microsoft.com/office/drawing/2014/main" id="{D794E3A5-BCD0-7F8D-AE0B-AFA3DC9A2034}"/>
+                </a:ext>
+              </a:extLst>
+            </p:cNvPr>
+            <p:cNvSpPr txBox="1"/>
+            <p:nvPr/>
+          </p:nvSpPr>
+          <p:spPr>
+            <a:xfrm>
+              <a:off x="3906512" y="2101224"/>
+              <a:ext cx="949427" cy="307777"/>
+            </a:xfrm>
+            <a:prstGeom prst="rect">
+              <a:avLst/>
+            </a:prstGeom>
+            <a:noFill/>
+          </p:spPr>
+          <p:txBody>
+            <a:bodyPr wrap="none" rtlCol="0">
+              <a:spAutoFit/>
+            </a:bodyPr>
+            <a:lstStyle/>
+            <a:p>
+              <a:r>
+                <a:rPr lang="en-US" sz="1400" i="1" dirty="0"/>
+                <a:t>divisibility</a:t>
+              </a:r>
+            </a:p>
+          </p:txBody>
+        </p:sp>
+        <p:sp>
+          <p:nvSpPr>
+            <p:cNvPr id="78" name="TextBox 77">
+              <a:extLst>
+                <a:ext uri="{FF2B5EF4-FFF2-40B4-BE49-F238E27FC236}">
+                  <a16:creationId xmlns:a16="http://schemas.microsoft.com/office/drawing/2014/main" id="{A53D799B-88FB-0EFA-3408-B6B212E7FC2B}"/>
+                </a:ext>
+              </a:extLst>
+            </p:cNvPr>
+            <p:cNvSpPr txBox="1"/>
+            <p:nvPr/>
+          </p:nvSpPr>
+          <p:spPr>
+            <a:xfrm>
+              <a:off x="4737011" y="730878"/>
+              <a:ext cx="935962" cy="646331"/>
+            </a:xfrm>
+            <a:prstGeom prst="rect">
+              <a:avLst/>
+            </a:prstGeom>
+            <a:noFill/>
+            <a:ln>
+              <a:solidFill>
+                <a:schemeClr val="tx1"/>
+              </a:solidFill>
+              <a:prstDash val="dash"/>
+            </a:ln>
+          </p:spPr>
+          <p:txBody>
+            <a:bodyPr wrap="none" rtlCol="0">
+              <a:spAutoFit/>
+            </a:bodyPr>
+            <a:lstStyle/>
+            <a:p>
+              <a:pPr algn="ctr"/>
+              <a:r>
+                <a:rPr lang="en-US" dirty="0"/>
+                <a:t>Finite</a:t>
+              </a:r>
+            </a:p>
+            <a:p>
+              <a:pPr algn="ctr"/>
+              <a:r>
+                <a:rPr lang="en-US" dirty="0"/>
+                <a:t>Algebra</a:t>
+              </a:r>
+            </a:p>
+          </p:txBody>
+        </p:sp>
+        <p:cxnSp>
+          <p:nvCxnSpPr>
+            <p:cNvPr id="79" name="Straight Arrow Connector 78">
+              <a:extLst>
+                <a:ext uri="{FF2B5EF4-FFF2-40B4-BE49-F238E27FC236}">
+                  <a16:creationId xmlns:a16="http://schemas.microsoft.com/office/drawing/2014/main" id="{C049567E-74E6-A974-558F-A057D3254596}"/>
+                </a:ext>
+              </a:extLst>
+            </p:cNvPr>
+            <p:cNvCxnSpPr>
+              <a:cxnSpLocks/>
+              <a:stCxn id="78" idx="2"/>
+              <a:endCxn id="4" idx="0"/>
+            </p:cNvCxnSpPr>
+            <p:nvPr/>
+          </p:nvCxnSpPr>
+          <p:spPr>
+            <a:xfrm flipH="1">
+              <a:off x="5193373" y="1377209"/>
+              <a:ext cx="11619" cy="266971"/>
+            </a:xfrm>
+            <a:prstGeom prst="straightConnector1">
+              <a:avLst/>
+            </a:prstGeom>
+            <a:ln>
+              <a:tailEnd type="triangle"/>
+            </a:ln>
+          </p:spPr>
+          <p:style>
+            <a:lnRef idx="2">
+              <a:schemeClr val="accent1"/>
+            </a:lnRef>
+            <a:fillRef idx="0">
+              <a:schemeClr val="accent1"/>
+            </a:fillRef>
+            <a:effectRef idx="1">
+              <a:schemeClr val="accent1"/>
+            </a:effectRef>
+            <a:fontRef idx="minor">
               <a:schemeClr val="tx1"/>
-            </a:solidFill>
-          </a:ln>
-        </p:spPr>
-        <p:txBody>
-          <a:bodyPr wrap="none" rtlCol="0">
-            <a:spAutoFit/>
-          </a:bodyPr>
-          <a:lstStyle/>
-          <a:p>
-            <a:r>
-              <a:rPr lang="en-US" dirty="0"/>
-              <a:t>Field</a:t>
-            </a:r>
-          </a:p>
-        </p:txBody>
-      </p:sp>
-      <p:sp>
-        <p:nvSpPr>
-          <p:cNvPr id="12" name="TextBox 11">
-            <a:extLst>
-              <a:ext uri="{FF2B5EF4-FFF2-40B4-BE49-F238E27FC236}">
-                <a16:creationId xmlns:a16="http://schemas.microsoft.com/office/drawing/2014/main" id="{D57EDEC3-C8B4-DDFE-66D8-C217A4A65813}"/>
-              </a:ext>
-            </a:extLst>
-          </p:cNvPr>
-          <p:cNvSpPr txBox="1"/>
-          <p:nvPr/>
-        </p:nvSpPr>
-        <p:spPr>
-          <a:xfrm>
-            <a:off x="6907334" y="4968677"/>
-            <a:ext cx="1457707" cy="369332"/>
-          </a:xfrm>
-          <a:prstGeom prst="rect">
-            <a:avLst/>
-          </a:prstGeom>
-          <a:noFill/>
-          <a:ln>
-            <a:solidFill>
+            </a:fontRef>
+          </p:style>
+        </p:cxnSp>
+        <p:sp>
+          <p:nvSpPr>
+            <p:cNvPr id="83" name="TextBox 82">
+              <a:extLst>
+                <a:ext uri="{FF2B5EF4-FFF2-40B4-BE49-F238E27FC236}">
+                  <a16:creationId xmlns:a16="http://schemas.microsoft.com/office/drawing/2014/main" id="{E8048652-5C70-A340-B5AB-E1817B9391C7}"/>
+                </a:ext>
+              </a:extLst>
+            </p:cNvPr>
+            <p:cNvSpPr txBox="1"/>
+            <p:nvPr/>
+          </p:nvSpPr>
+          <p:spPr>
+            <a:xfrm>
+              <a:off x="7571352" y="3212274"/>
+              <a:ext cx="1287981" cy="923330"/>
+            </a:xfrm>
+            <a:prstGeom prst="rect">
+              <a:avLst/>
+            </a:prstGeom>
+            <a:noFill/>
+            <a:ln>
+              <a:solidFill>
+                <a:schemeClr val="tx1"/>
+              </a:solidFill>
+              <a:prstDash val="dash"/>
+            </a:ln>
+          </p:spPr>
+          <p:txBody>
+            <a:bodyPr wrap="none" rtlCol="0">
+              <a:spAutoFit/>
+            </a:bodyPr>
+            <a:lstStyle>
+              <a:defPPr>
+                <a:defRPr lang="en-US"/>
+              </a:defPPr>
+              <a:lvl1pPr algn="ctr"/>
+            </a:lstStyle>
+            <a:p>
+              <a:r>
+                <a:rPr lang="en-US" dirty="0"/>
+                <a:t>Finite</a:t>
+              </a:r>
+            </a:p>
+            <a:p>
+              <a:r>
+                <a:rPr lang="en-US" dirty="0"/>
+                <a:t>Composite</a:t>
+              </a:r>
+            </a:p>
+            <a:p>
+              <a:r>
+                <a:rPr lang="en-US" dirty="0"/>
+                <a:t>Algebra</a:t>
+              </a:r>
+            </a:p>
+          </p:txBody>
+        </p:sp>
+        <p:cxnSp>
+          <p:nvCxnSpPr>
+            <p:cNvPr id="84" name="Straight Arrow Connector 83">
+              <a:extLst>
+                <a:ext uri="{FF2B5EF4-FFF2-40B4-BE49-F238E27FC236}">
+                  <a16:creationId xmlns:a16="http://schemas.microsoft.com/office/drawing/2014/main" id="{B1C72590-3B0A-AB2B-A8C4-57CC9F9FBDE6}"/>
+                </a:ext>
+              </a:extLst>
+            </p:cNvPr>
+            <p:cNvCxnSpPr>
+              <a:cxnSpLocks/>
+              <a:stCxn id="83" idx="2"/>
+              <a:endCxn id="13" idx="0"/>
+            </p:cNvCxnSpPr>
+            <p:nvPr/>
+          </p:nvCxnSpPr>
+          <p:spPr>
+            <a:xfrm flipH="1">
+              <a:off x="8215342" y="4135604"/>
+              <a:ext cx="1" cy="276999"/>
+            </a:xfrm>
+            <a:prstGeom prst="straightConnector1">
+              <a:avLst/>
+            </a:prstGeom>
+            <a:ln>
+              <a:tailEnd type="triangle"/>
+            </a:ln>
+          </p:spPr>
+          <p:style>
+            <a:lnRef idx="2">
+              <a:schemeClr val="accent1"/>
+            </a:lnRef>
+            <a:fillRef idx="0">
+              <a:schemeClr val="accent1"/>
+            </a:fillRef>
+            <a:effectRef idx="1">
+              <a:schemeClr val="accent1"/>
+            </a:effectRef>
+            <a:fontRef idx="minor">
               <a:schemeClr val="tx1"/>
-            </a:solidFill>
-          </a:ln>
-        </p:spPr>
-        <p:txBody>
-          <a:bodyPr wrap="none" rtlCol="0">
-            <a:spAutoFit/>
-          </a:bodyPr>
-          <a:lstStyle/>
-          <a:p>
-            <a:r>
-              <a:rPr lang="en-US" dirty="0" err="1"/>
-              <a:t>VectorSpace</a:t>
-            </a:r>
-            <a:endParaRPr lang="en-US" dirty="0"/>
-          </a:p>
-        </p:txBody>
-      </p:sp>
-      <p:sp>
-        <p:nvSpPr>
-          <p:cNvPr id="13" name="TextBox 12">
-            <a:extLst>
-              <a:ext uri="{FF2B5EF4-FFF2-40B4-BE49-F238E27FC236}">
-                <a16:creationId xmlns:a16="http://schemas.microsoft.com/office/drawing/2014/main" id="{BE940B4E-7487-C9AF-63D4-6ECAE4D08D51}"/>
-              </a:ext>
-            </a:extLst>
-          </p:cNvPr>
-          <p:cNvSpPr txBox="1"/>
-          <p:nvPr/>
-        </p:nvSpPr>
-        <p:spPr>
-          <a:xfrm>
-            <a:off x="7169554" y="4177699"/>
-            <a:ext cx="933269" cy="369332"/>
-          </a:xfrm>
-          <a:prstGeom prst="rect">
-            <a:avLst/>
-          </a:prstGeom>
-          <a:noFill/>
-          <a:ln>
-            <a:solidFill>
+            </a:fontRef>
+          </p:style>
+        </p:cxnSp>
+        <p:cxnSp>
+          <p:nvCxnSpPr>
+            <p:cNvPr id="87" name="Straight Arrow Connector 86">
+              <a:extLst>
+                <a:ext uri="{FF2B5EF4-FFF2-40B4-BE49-F238E27FC236}">
+                  <a16:creationId xmlns:a16="http://schemas.microsoft.com/office/drawing/2014/main" id="{53A2F2FC-5290-8CED-D06A-C18281569569}"/>
+                </a:ext>
+              </a:extLst>
+            </p:cNvPr>
+            <p:cNvCxnSpPr>
+              <a:cxnSpLocks/>
+              <a:stCxn id="13" idx="2"/>
+              <a:endCxn id="12" idx="0"/>
+            </p:cNvCxnSpPr>
+            <p:nvPr/>
+          </p:nvCxnSpPr>
+          <p:spPr>
+            <a:xfrm flipH="1">
+              <a:off x="8215341" y="4781935"/>
+              <a:ext cx="1" cy="421646"/>
+            </a:xfrm>
+            <a:prstGeom prst="straightConnector1">
+              <a:avLst/>
+            </a:prstGeom>
+            <a:ln>
+              <a:tailEnd type="triangle"/>
+            </a:ln>
+          </p:spPr>
+          <p:style>
+            <a:lnRef idx="2">
+              <a:schemeClr val="accent1"/>
+            </a:lnRef>
+            <a:fillRef idx="0">
+              <a:schemeClr val="accent1"/>
+            </a:fillRef>
+            <a:effectRef idx="1">
+              <a:schemeClr val="accent1"/>
+            </a:effectRef>
+            <a:fontRef idx="minor">
               <a:schemeClr val="tx1"/>
-            </a:solidFill>
-          </a:ln>
-        </p:spPr>
-        <p:txBody>
-          <a:bodyPr wrap="none" rtlCol="0">
-            <a:spAutoFit/>
-          </a:bodyPr>
-          <a:lstStyle/>
-          <a:p>
-            <a:r>
-              <a:rPr lang="en-US" dirty="0"/>
-              <a:t>Module</a:t>
-            </a:r>
-          </a:p>
-        </p:txBody>
-      </p:sp>
-      <p:cxnSp>
-        <p:nvCxnSpPr>
-          <p:cNvPr id="15" name="Straight Arrow Connector 14">
-            <a:extLst>
-              <a:ext uri="{FF2B5EF4-FFF2-40B4-BE49-F238E27FC236}">
-                <a16:creationId xmlns:a16="http://schemas.microsoft.com/office/drawing/2014/main" id="{336C84C1-B936-3CD9-C4C7-32AE98B503FE}"/>
-              </a:ext>
-            </a:extLst>
-          </p:cNvPr>
-          <p:cNvCxnSpPr>
-            <a:stCxn id="4" idx="2"/>
-            <a:endCxn id="5" idx="0"/>
-          </p:cNvCxnSpPr>
-          <p:nvPr/>
-        </p:nvCxnSpPr>
-        <p:spPr>
-          <a:xfrm flipH="1">
-            <a:off x="3939353" y="1778608"/>
-            <a:ext cx="674867" cy="580155"/>
-          </a:xfrm>
-          <a:prstGeom prst="straightConnector1">
-            <a:avLst/>
-          </a:prstGeom>
-          <a:ln>
-            <a:tailEnd type="triangle"/>
-          </a:ln>
-        </p:spPr>
-        <p:style>
-          <a:lnRef idx="2">
-            <a:schemeClr val="accent1"/>
-          </a:lnRef>
-          <a:fillRef idx="0">
-            <a:schemeClr val="accent1"/>
-          </a:fillRef>
-          <a:effectRef idx="1">
-            <a:schemeClr val="accent1"/>
-          </a:effectRef>
-          <a:fontRef idx="minor">
-            <a:schemeClr val="tx1"/>
-          </a:fontRef>
-        </p:style>
-      </p:cxnSp>
-      <p:cxnSp>
-        <p:nvCxnSpPr>
-          <p:cNvPr id="17" name="Straight Arrow Connector 16">
-            <a:extLst>
-              <a:ext uri="{FF2B5EF4-FFF2-40B4-BE49-F238E27FC236}">
-                <a16:creationId xmlns:a16="http://schemas.microsoft.com/office/drawing/2014/main" id="{B37F10B1-A918-6EA5-537A-A42D84DA110C}"/>
-              </a:ext>
-            </a:extLst>
-          </p:cNvPr>
-          <p:cNvCxnSpPr>
-            <a:stCxn id="4" idx="2"/>
-            <a:endCxn id="7" idx="0"/>
-          </p:cNvCxnSpPr>
-          <p:nvPr/>
-        </p:nvCxnSpPr>
-        <p:spPr>
-          <a:xfrm>
-            <a:off x="4614220" y="1778608"/>
-            <a:ext cx="764019" cy="580155"/>
-          </a:xfrm>
-          <a:prstGeom prst="straightConnector1">
-            <a:avLst/>
-          </a:prstGeom>
-          <a:ln>
-            <a:tailEnd type="triangle"/>
-          </a:ln>
-        </p:spPr>
-        <p:style>
-          <a:lnRef idx="2">
-            <a:schemeClr val="accent1"/>
-          </a:lnRef>
-          <a:fillRef idx="0">
-            <a:schemeClr val="accent1"/>
-          </a:fillRef>
-          <a:effectRef idx="1">
-            <a:schemeClr val="accent1"/>
-          </a:effectRef>
-          <a:fontRef idx="minor">
-            <a:schemeClr val="tx1"/>
-          </a:fontRef>
-        </p:style>
-      </p:cxnSp>
-      <p:cxnSp>
-        <p:nvCxnSpPr>
-          <p:cNvPr id="19" name="Straight Arrow Connector 18">
-            <a:extLst>
-              <a:ext uri="{FF2B5EF4-FFF2-40B4-BE49-F238E27FC236}">
-                <a16:creationId xmlns:a16="http://schemas.microsoft.com/office/drawing/2014/main" id="{BA601927-E942-9A76-95A0-602E3C979347}"/>
-              </a:ext>
-            </a:extLst>
-          </p:cNvPr>
-          <p:cNvCxnSpPr>
-            <a:stCxn id="5" idx="2"/>
-            <a:endCxn id="6" idx="0"/>
-          </p:cNvCxnSpPr>
-          <p:nvPr/>
-        </p:nvCxnSpPr>
-        <p:spPr>
-          <a:xfrm>
-            <a:off x="3939353" y="2728095"/>
-            <a:ext cx="1798" cy="421646"/>
-          </a:xfrm>
-          <a:prstGeom prst="straightConnector1">
-            <a:avLst/>
-          </a:prstGeom>
-          <a:ln>
-            <a:tailEnd type="triangle"/>
-          </a:ln>
-        </p:spPr>
-        <p:style>
-          <a:lnRef idx="2">
-            <a:schemeClr val="accent1"/>
-          </a:lnRef>
-          <a:fillRef idx="0">
-            <a:schemeClr val="accent1"/>
-          </a:fillRef>
-          <a:effectRef idx="1">
-            <a:schemeClr val="accent1"/>
-          </a:effectRef>
-          <a:fontRef idx="minor">
-            <a:schemeClr val="tx1"/>
-          </a:fontRef>
-        </p:style>
-      </p:cxnSp>
-      <p:cxnSp>
-        <p:nvCxnSpPr>
-          <p:cNvPr id="21" name="Straight Arrow Connector 20">
-            <a:extLst>
-              <a:ext uri="{FF2B5EF4-FFF2-40B4-BE49-F238E27FC236}">
-                <a16:creationId xmlns:a16="http://schemas.microsoft.com/office/drawing/2014/main" id="{AF48B7B4-7012-1658-DA5D-0E7C960F8227}"/>
-              </a:ext>
-            </a:extLst>
-          </p:cNvPr>
-          <p:cNvCxnSpPr>
-            <a:stCxn id="7" idx="2"/>
-            <a:endCxn id="8" idx="0"/>
-          </p:cNvCxnSpPr>
-          <p:nvPr/>
-        </p:nvCxnSpPr>
-        <p:spPr>
-          <a:xfrm>
-            <a:off x="5378239" y="2728095"/>
-            <a:ext cx="2" cy="421646"/>
-          </a:xfrm>
-          <a:prstGeom prst="straightConnector1">
-            <a:avLst/>
-          </a:prstGeom>
-          <a:ln>
-            <a:tailEnd type="triangle"/>
-          </a:ln>
-        </p:spPr>
-        <p:style>
-          <a:lnRef idx="2">
-            <a:schemeClr val="accent1"/>
-          </a:lnRef>
-          <a:fillRef idx="0">
-            <a:schemeClr val="accent1"/>
-          </a:fillRef>
-          <a:effectRef idx="1">
-            <a:schemeClr val="accent1"/>
-          </a:effectRef>
-          <a:fontRef idx="minor">
-            <a:schemeClr val="tx1"/>
-          </a:fontRef>
-        </p:style>
-      </p:cxnSp>
-      <p:cxnSp>
-        <p:nvCxnSpPr>
-          <p:cNvPr id="23" name="Straight Arrow Connector 22">
-            <a:extLst>
-              <a:ext uri="{FF2B5EF4-FFF2-40B4-BE49-F238E27FC236}">
-                <a16:creationId xmlns:a16="http://schemas.microsoft.com/office/drawing/2014/main" id="{90F7E948-D73A-9E48-A473-25027EB4CD58}"/>
-              </a:ext>
-            </a:extLst>
-          </p:cNvPr>
-          <p:cNvCxnSpPr>
-            <a:stCxn id="8" idx="2"/>
-            <a:endCxn id="9" idx="0"/>
-          </p:cNvCxnSpPr>
-          <p:nvPr/>
-        </p:nvCxnSpPr>
-        <p:spPr>
-          <a:xfrm flipH="1">
-            <a:off x="5378240" y="3519073"/>
-            <a:ext cx="1" cy="421646"/>
-          </a:xfrm>
-          <a:prstGeom prst="straightConnector1">
-            <a:avLst/>
-          </a:prstGeom>
-          <a:ln>
-            <a:tailEnd type="triangle"/>
-          </a:ln>
-        </p:spPr>
-        <p:style>
-          <a:lnRef idx="2">
-            <a:schemeClr val="accent1"/>
-          </a:lnRef>
-          <a:fillRef idx="0">
-            <a:schemeClr val="accent1"/>
-          </a:fillRef>
-          <a:effectRef idx="1">
-            <a:schemeClr val="accent1"/>
-          </a:effectRef>
-          <a:fontRef idx="minor">
-            <a:schemeClr val="tx1"/>
-          </a:fontRef>
-        </p:style>
-      </p:cxnSp>
-      <p:cxnSp>
-        <p:nvCxnSpPr>
-          <p:cNvPr id="25" name="Straight Arrow Connector 24">
-            <a:extLst>
-              <a:ext uri="{FF2B5EF4-FFF2-40B4-BE49-F238E27FC236}">
-                <a16:creationId xmlns:a16="http://schemas.microsoft.com/office/drawing/2014/main" id="{4998AF41-4797-0FE8-A46B-E800CD91EA3B}"/>
-              </a:ext>
-            </a:extLst>
-          </p:cNvPr>
-          <p:cNvCxnSpPr>
-            <a:stCxn id="9" idx="2"/>
-            <a:endCxn id="10" idx="0"/>
-          </p:cNvCxnSpPr>
-          <p:nvPr/>
-        </p:nvCxnSpPr>
-        <p:spPr>
-          <a:xfrm>
-            <a:off x="5378240" y="4310051"/>
-            <a:ext cx="0" cy="236980"/>
-          </a:xfrm>
-          <a:prstGeom prst="straightConnector1">
-            <a:avLst/>
-          </a:prstGeom>
-          <a:ln>
-            <a:tailEnd type="triangle"/>
-          </a:ln>
-        </p:spPr>
-        <p:style>
-          <a:lnRef idx="2">
-            <a:schemeClr val="accent1"/>
-          </a:lnRef>
-          <a:fillRef idx="0">
-            <a:schemeClr val="accent1"/>
-          </a:fillRef>
-          <a:effectRef idx="1">
-            <a:schemeClr val="accent1"/>
-          </a:effectRef>
-          <a:fontRef idx="minor">
-            <a:schemeClr val="tx1"/>
-          </a:fontRef>
-        </p:style>
-      </p:cxnSp>
-      <p:cxnSp>
-        <p:nvCxnSpPr>
-          <p:cNvPr id="27" name="Straight Arrow Connector 26">
-            <a:extLst>
-              <a:ext uri="{FF2B5EF4-FFF2-40B4-BE49-F238E27FC236}">
-                <a16:creationId xmlns:a16="http://schemas.microsoft.com/office/drawing/2014/main" id="{4DBC1D45-9EBD-818A-03A9-259B0C475CD4}"/>
-              </a:ext>
-            </a:extLst>
-          </p:cNvPr>
-          <p:cNvCxnSpPr>
-            <a:stCxn id="10" idx="2"/>
-            <a:endCxn id="11" idx="0"/>
-          </p:cNvCxnSpPr>
-          <p:nvPr/>
-        </p:nvCxnSpPr>
-        <p:spPr>
-          <a:xfrm flipH="1">
-            <a:off x="5378239" y="4916363"/>
-            <a:ext cx="1" cy="236980"/>
-          </a:xfrm>
-          <a:prstGeom prst="straightConnector1">
-            <a:avLst/>
-          </a:prstGeom>
-          <a:ln>
-            <a:tailEnd type="triangle"/>
-          </a:ln>
-        </p:spPr>
-        <p:style>
-          <a:lnRef idx="2">
-            <a:schemeClr val="accent1"/>
-          </a:lnRef>
-          <a:fillRef idx="0">
-            <a:schemeClr val="accent1"/>
-          </a:fillRef>
-          <a:effectRef idx="1">
-            <a:schemeClr val="accent1"/>
-          </a:effectRef>
-          <a:fontRef idx="minor">
-            <a:schemeClr val="tx1"/>
-          </a:fontRef>
-        </p:style>
-      </p:cxnSp>
-      <p:sp>
-        <p:nvSpPr>
-          <p:cNvPr id="59" name="TextBox 58">
-            <a:extLst>
-              <a:ext uri="{FF2B5EF4-FFF2-40B4-BE49-F238E27FC236}">
-                <a16:creationId xmlns:a16="http://schemas.microsoft.com/office/drawing/2014/main" id="{03ED8F1A-9E81-D654-849D-9B198A0BB3FB}"/>
-              </a:ext>
-            </a:extLst>
-          </p:cNvPr>
-          <p:cNvSpPr txBox="1"/>
-          <p:nvPr/>
-        </p:nvSpPr>
-        <p:spPr>
-          <a:xfrm>
-            <a:off x="8780531" y="4830177"/>
-            <a:ext cx="1609736" cy="646331"/>
-          </a:xfrm>
-          <a:prstGeom prst="rect">
-            <a:avLst/>
-          </a:prstGeom>
-          <a:noFill/>
-          <a:ln>
-            <a:solidFill>
+            </a:fontRef>
+          </p:style>
+        </p:cxnSp>
+        <p:cxnSp>
+          <p:nvCxnSpPr>
+            <p:cNvPr id="109" name="Straight Arrow Connector 108">
+              <a:extLst>
+                <a:ext uri="{FF2B5EF4-FFF2-40B4-BE49-F238E27FC236}">
+                  <a16:creationId xmlns:a16="http://schemas.microsoft.com/office/drawing/2014/main" id="{EA490DB7-FE54-F64F-1BC4-8810A3DF3136}"/>
+                </a:ext>
+              </a:extLst>
+            </p:cNvPr>
+            <p:cNvCxnSpPr>
+              <a:cxnSpLocks/>
+              <a:stCxn id="13" idx="3"/>
+              <a:endCxn id="60" idx="1"/>
+            </p:cNvCxnSpPr>
+            <p:nvPr/>
+          </p:nvCxnSpPr>
+          <p:spPr>
+            <a:xfrm>
+              <a:off x="8681976" y="4597269"/>
+              <a:ext cx="677708" cy="0"/>
+            </a:xfrm>
+            <a:prstGeom prst="straightConnector1">
+              <a:avLst/>
+            </a:prstGeom>
+            <a:ln>
+              <a:tailEnd type="triangle"/>
+            </a:ln>
+          </p:spPr>
+          <p:style>
+            <a:lnRef idx="2">
+              <a:schemeClr val="accent1"/>
+            </a:lnRef>
+            <a:fillRef idx="0">
+              <a:schemeClr val="accent1"/>
+            </a:fillRef>
+            <a:effectRef idx="1">
+              <a:schemeClr val="accent1"/>
+            </a:effectRef>
+            <a:fontRef idx="minor">
               <a:schemeClr val="tx1"/>
-            </a:solidFill>
-          </a:ln>
-        </p:spPr>
-        <p:txBody>
-          <a:bodyPr wrap="none" rtlCol="0">
-            <a:spAutoFit/>
-          </a:bodyPr>
-          <a:lstStyle/>
-          <a:p>
-            <a:pPr algn="ctr"/>
-            <a:r>
-              <a:rPr lang="en-US" dirty="0" err="1"/>
-              <a:t>Ndimensional</a:t>
-            </a:r>
-            <a:endParaRPr lang="en-US" dirty="0"/>
-          </a:p>
-          <a:p>
-            <a:pPr algn="ctr"/>
-            <a:r>
-              <a:rPr lang="en-US" dirty="0" err="1"/>
-              <a:t>VectorSpace</a:t>
-            </a:r>
-            <a:endParaRPr lang="en-US" dirty="0"/>
-          </a:p>
-        </p:txBody>
-      </p:sp>
-      <p:sp>
-        <p:nvSpPr>
-          <p:cNvPr id="60" name="TextBox 59">
-            <a:extLst>
-              <a:ext uri="{FF2B5EF4-FFF2-40B4-BE49-F238E27FC236}">
-                <a16:creationId xmlns:a16="http://schemas.microsoft.com/office/drawing/2014/main" id="{EA094043-AD46-F541-59E0-A321B7DF1BD4}"/>
-              </a:ext>
-            </a:extLst>
-          </p:cNvPr>
-          <p:cNvSpPr txBox="1"/>
-          <p:nvPr/>
-        </p:nvSpPr>
-        <p:spPr>
-          <a:xfrm>
-            <a:off x="8780531" y="4039199"/>
-            <a:ext cx="1609736" cy="646331"/>
-          </a:xfrm>
-          <a:prstGeom prst="rect">
-            <a:avLst/>
-          </a:prstGeom>
-          <a:noFill/>
-          <a:ln>
-            <a:solidFill>
+            </a:fontRef>
+          </p:style>
+        </p:cxnSp>
+        <p:cxnSp>
+          <p:nvCxnSpPr>
+            <p:cNvPr id="112" name="Straight Arrow Connector 111">
+              <a:extLst>
+                <a:ext uri="{FF2B5EF4-FFF2-40B4-BE49-F238E27FC236}">
+                  <a16:creationId xmlns:a16="http://schemas.microsoft.com/office/drawing/2014/main" id="{8AE88354-471D-461F-708B-29D8BC1B096C}"/>
+                </a:ext>
+              </a:extLst>
+            </p:cNvPr>
+            <p:cNvCxnSpPr>
+              <a:cxnSpLocks/>
+              <a:stCxn id="12" idx="3"/>
+              <a:endCxn id="59" idx="1"/>
+            </p:cNvCxnSpPr>
+            <p:nvPr/>
+          </p:nvCxnSpPr>
+          <p:spPr>
+            <a:xfrm>
+              <a:off x="8944194" y="5388247"/>
+              <a:ext cx="415490" cy="0"/>
+            </a:xfrm>
+            <a:prstGeom prst="straightConnector1">
+              <a:avLst/>
+            </a:prstGeom>
+            <a:ln>
+              <a:tailEnd type="triangle"/>
+            </a:ln>
+          </p:spPr>
+          <p:style>
+            <a:lnRef idx="2">
+              <a:schemeClr val="accent1"/>
+            </a:lnRef>
+            <a:fillRef idx="0">
+              <a:schemeClr val="accent1"/>
+            </a:fillRef>
+            <a:effectRef idx="1">
+              <a:schemeClr val="accent1"/>
+            </a:effectRef>
+            <a:fontRef idx="minor">
               <a:schemeClr val="tx1"/>
-            </a:solidFill>
-          </a:ln>
-        </p:spPr>
-        <p:txBody>
-          <a:bodyPr wrap="none" rtlCol="0">
-            <a:spAutoFit/>
-          </a:bodyPr>
-          <a:lstStyle/>
-          <a:p>
-            <a:pPr algn="ctr"/>
-            <a:r>
-              <a:rPr lang="en-US" dirty="0" err="1"/>
-              <a:t>Ndimensional</a:t>
-            </a:r>
-            <a:endParaRPr lang="en-US" dirty="0"/>
-          </a:p>
-          <a:p>
-            <a:pPr algn="ctr"/>
-            <a:r>
-              <a:rPr lang="en-US" dirty="0"/>
-              <a:t>Module</a:t>
-            </a:r>
-          </a:p>
-        </p:txBody>
-      </p:sp>
-      <p:sp>
-        <p:nvSpPr>
-          <p:cNvPr id="66" name="TextBox 65">
-            <a:extLst>
-              <a:ext uri="{FF2B5EF4-FFF2-40B4-BE49-F238E27FC236}">
-                <a16:creationId xmlns:a16="http://schemas.microsoft.com/office/drawing/2014/main" id="{1BA71155-84A6-8C5B-24AD-EDD59340EE69}"/>
-              </a:ext>
-            </a:extLst>
-          </p:cNvPr>
-          <p:cNvSpPr txBox="1"/>
-          <p:nvPr/>
-        </p:nvSpPr>
-        <p:spPr>
-          <a:xfrm>
-            <a:off x="4974892" y="1866320"/>
-            <a:ext cx="1144993" cy="307777"/>
-          </a:xfrm>
-          <a:prstGeom prst="rect">
-            <a:avLst/>
-          </a:prstGeom>
-          <a:noFill/>
-        </p:spPr>
-        <p:txBody>
-          <a:bodyPr wrap="none" rtlCol="0">
-            <a:spAutoFit/>
-          </a:bodyPr>
-          <a:lstStyle/>
-          <a:p>
-            <a:r>
-              <a:rPr lang="en-US" sz="1400" i="1" dirty="0"/>
-              <a:t>associativity</a:t>
-            </a:r>
-          </a:p>
-        </p:txBody>
-      </p:sp>
-      <p:sp>
-        <p:nvSpPr>
-          <p:cNvPr id="67" name="TextBox 66">
-            <a:extLst>
-              <a:ext uri="{FF2B5EF4-FFF2-40B4-BE49-F238E27FC236}">
-                <a16:creationId xmlns:a16="http://schemas.microsoft.com/office/drawing/2014/main" id="{CDCCDBBD-3F46-8164-93B4-B91F38E89FB7}"/>
-              </a:ext>
-            </a:extLst>
-          </p:cNvPr>
-          <p:cNvSpPr txBox="1"/>
-          <p:nvPr/>
-        </p:nvSpPr>
-        <p:spPr>
-          <a:xfrm>
-            <a:off x="5367857" y="2735378"/>
-            <a:ext cx="758669" cy="307777"/>
-          </a:xfrm>
-          <a:prstGeom prst="rect">
-            <a:avLst/>
-          </a:prstGeom>
-          <a:noFill/>
-        </p:spPr>
-        <p:txBody>
-          <a:bodyPr wrap="none" rtlCol="0">
-            <a:spAutoFit/>
-          </a:bodyPr>
-          <a:lstStyle/>
-          <a:p>
-            <a:r>
-              <a:rPr lang="en-US" sz="1400" i="1" dirty="0"/>
-              <a:t>identity</a:t>
-            </a:r>
-          </a:p>
-        </p:txBody>
-      </p:sp>
-      <p:sp>
-        <p:nvSpPr>
-          <p:cNvPr id="68" name="TextBox 67">
-            <a:extLst>
-              <a:ext uri="{FF2B5EF4-FFF2-40B4-BE49-F238E27FC236}">
-                <a16:creationId xmlns:a16="http://schemas.microsoft.com/office/drawing/2014/main" id="{565344A0-D795-1F9A-9DC7-A6AED118EF96}"/>
-              </a:ext>
-            </a:extLst>
-          </p:cNvPr>
-          <p:cNvSpPr txBox="1"/>
-          <p:nvPr/>
-        </p:nvSpPr>
-        <p:spPr>
-          <a:xfrm>
-            <a:off x="3200101" y="2735378"/>
-            <a:ext cx="758669" cy="307777"/>
-          </a:xfrm>
-          <a:prstGeom prst="rect">
-            <a:avLst/>
-          </a:prstGeom>
-          <a:noFill/>
-        </p:spPr>
-        <p:txBody>
-          <a:bodyPr wrap="none" rtlCol="0">
-            <a:spAutoFit/>
-          </a:bodyPr>
-          <a:lstStyle/>
-          <a:p>
-            <a:r>
-              <a:rPr lang="en-US" sz="1400" i="1" dirty="0"/>
-              <a:t>identity</a:t>
-            </a:r>
-          </a:p>
-        </p:txBody>
-      </p:sp>
-      <p:sp>
-        <p:nvSpPr>
-          <p:cNvPr id="69" name="TextBox 68">
-            <a:extLst>
-              <a:ext uri="{FF2B5EF4-FFF2-40B4-BE49-F238E27FC236}">
-                <a16:creationId xmlns:a16="http://schemas.microsoft.com/office/drawing/2014/main" id="{6B21F4B4-E597-BDBE-C624-3E3E45EBDC09}"/>
-              </a:ext>
-            </a:extLst>
-          </p:cNvPr>
-          <p:cNvSpPr txBox="1"/>
-          <p:nvPr/>
-        </p:nvSpPr>
-        <p:spPr>
-          <a:xfrm>
-            <a:off x="5390528" y="3528865"/>
-            <a:ext cx="1032655" cy="307777"/>
-          </a:xfrm>
-          <a:prstGeom prst="rect">
-            <a:avLst/>
-          </a:prstGeom>
-          <a:noFill/>
-        </p:spPr>
-        <p:txBody>
-          <a:bodyPr wrap="none" rtlCol="0">
-            <a:spAutoFit/>
-          </a:bodyPr>
-          <a:lstStyle/>
-          <a:p>
-            <a:r>
-              <a:rPr lang="en-US" sz="1400" i="1" dirty="0"/>
-              <a:t>Invertibility</a:t>
-            </a:r>
-          </a:p>
-        </p:txBody>
-      </p:sp>
-      <p:sp>
-        <p:nvSpPr>
-          <p:cNvPr id="70" name="TextBox 69">
-            <a:extLst>
-              <a:ext uri="{FF2B5EF4-FFF2-40B4-BE49-F238E27FC236}">
-                <a16:creationId xmlns:a16="http://schemas.microsoft.com/office/drawing/2014/main" id="{D794E3A5-BCD0-7F8D-AE0B-AFA3DC9A2034}"/>
-              </a:ext>
-            </a:extLst>
-          </p:cNvPr>
-          <p:cNvSpPr txBox="1"/>
-          <p:nvPr/>
-        </p:nvSpPr>
-        <p:spPr>
-          <a:xfrm>
-            <a:off x="3327359" y="1866320"/>
-            <a:ext cx="949427" cy="307777"/>
-          </a:xfrm>
-          <a:prstGeom prst="rect">
-            <a:avLst/>
-          </a:prstGeom>
-          <a:noFill/>
-        </p:spPr>
-        <p:txBody>
-          <a:bodyPr wrap="none" rtlCol="0">
-            <a:spAutoFit/>
-          </a:bodyPr>
-          <a:lstStyle/>
-          <a:p>
-            <a:r>
-              <a:rPr lang="en-US" sz="1400" i="1" dirty="0"/>
-              <a:t>divisibility</a:t>
-            </a:r>
-          </a:p>
-        </p:txBody>
-      </p:sp>
-      <p:cxnSp>
-        <p:nvCxnSpPr>
-          <p:cNvPr id="74" name="Straight Arrow Connector 73">
-            <a:extLst>
-              <a:ext uri="{FF2B5EF4-FFF2-40B4-BE49-F238E27FC236}">
-                <a16:creationId xmlns:a16="http://schemas.microsoft.com/office/drawing/2014/main" id="{2ACE94A9-2899-D3A3-360A-130D0FD53327}"/>
-              </a:ext>
-            </a:extLst>
-          </p:cNvPr>
-          <p:cNvCxnSpPr/>
-          <p:nvPr/>
-        </p:nvCxnSpPr>
-        <p:spPr>
-          <a:xfrm>
-            <a:off x="4276786" y="3519073"/>
-            <a:ext cx="698106" cy="421646"/>
-          </a:xfrm>
-          <a:prstGeom prst="straightConnector1">
-            <a:avLst/>
-          </a:prstGeom>
-          <a:ln>
-            <a:solidFill>
-              <a:schemeClr val="bg1">
-                <a:lumMod val="65000"/>
-              </a:schemeClr>
-            </a:solidFill>
-            <a:prstDash val="dash"/>
-            <a:tailEnd type="triangle"/>
-          </a:ln>
-        </p:spPr>
-        <p:style>
-          <a:lnRef idx="2">
-            <a:schemeClr val="accent1"/>
-          </a:lnRef>
-          <a:fillRef idx="0">
-            <a:schemeClr val="accent1"/>
-          </a:fillRef>
-          <a:effectRef idx="1">
-            <a:schemeClr val="accent1"/>
-          </a:effectRef>
-          <a:fontRef idx="minor">
-            <a:schemeClr val="tx1"/>
-          </a:fontRef>
-        </p:style>
-      </p:cxnSp>
-      <p:sp>
-        <p:nvSpPr>
-          <p:cNvPr id="75" name="TextBox 74">
-            <a:extLst>
-              <a:ext uri="{FF2B5EF4-FFF2-40B4-BE49-F238E27FC236}">
-                <a16:creationId xmlns:a16="http://schemas.microsoft.com/office/drawing/2014/main" id="{AD937BD8-7F4A-D2C3-3B36-BE7680221482}"/>
-              </a:ext>
-            </a:extLst>
-          </p:cNvPr>
-          <p:cNvSpPr txBox="1"/>
-          <p:nvPr/>
-        </p:nvSpPr>
-        <p:spPr>
-          <a:xfrm>
-            <a:off x="3523943" y="3634664"/>
-            <a:ext cx="1144993" cy="307777"/>
-          </a:xfrm>
-          <a:prstGeom prst="rect">
-            <a:avLst/>
-          </a:prstGeom>
-          <a:noFill/>
-        </p:spPr>
-        <p:txBody>
-          <a:bodyPr wrap="none" rtlCol="0">
-            <a:spAutoFit/>
-          </a:bodyPr>
-          <a:lstStyle/>
-          <a:p>
-            <a:r>
-              <a:rPr lang="en-US" sz="1400" i="1" dirty="0">
+            </a:fontRef>
+          </p:style>
+        </p:cxnSp>
+        <p:grpSp>
+          <p:nvGrpSpPr>
+            <p:cNvPr id="36" name="Group 35">
+              <a:extLst>
+                <a:ext uri="{FF2B5EF4-FFF2-40B4-BE49-F238E27FC236}">
+                  <a16:creationId xmlns:a16="http://schemas.microsoft.com/office/drawing/2014/main" id="{1A52E01C-6574-3C8B-5D73-E71AAB3F7994}"/>
+                </a:ext>
+              </a:extLst>
+            </p:cNvPr>
+            <p:cNvGrpSpPr/>
+            <p:nvPr/>
+          </p:nvGrpSpPr>
+          <p:grpSpPr>
+            <a:xfrm>
+              <a:off x="8056685" y="654886"/>
+              <a:ext cx="2190508" cy="2164541"/>
+              <a:chOff x="893379" y="2543429"/>
+              <a:chExt cx="2908693" cy="2979246"/>
+            </a:xfrm>
+          </p:grpSpPr>
+          <p:sp>
+            <p:nvSpPr>
+              <p:cNvPr id="29" name="Rectangle 28">
+                <a:extLst>
+                  <a:ext uri="{FF2B5EF4-FFF2-40B4-BE49-F238E27FC236}">
+                    <a16:creationId xmlns:a16="http://schemas.microsoft.com/office/drawing/2014/main" id="{909EBC9D-8CB2-CA4B-B718-C00A85D6C8A6}"/>
+                  </a:ext>
+                </a:extLst>
+              </p:cNvPr>
+              <p:cNvSpPr/>
+              <p:nvPr/>
+            </p:nvSpPr>
+            <p:spPr>
+              <a:xfrm>
+                <a:off x="893379" y="2543429"/>
+                <a:ext cx="2908693" cy="2979246"/>
+              </a:xfrm>
+              <a:prstGeom prst="rect">
+                <a:avLst/>
+              </a:prstGeom>
+              <a:solidFill>
+                <a:schemeClr val="bg1">
+                  <a:lumMod val="95000"/>
+                </a:schemeClr>
+              </a:solidFill>
+            </p:spPr>
+            <p:style>
+              <a:lnRef idx="2">
+                <a:schemeClr val="accent1">
+                  <a:shade val="15000"/>
+                </a:schemeClr>
+              </a:lnRef>
+              <a:fillRef idx="1">
+                <a:schemeClr val="accent1"/>
+              </a:fillRef>
+              <a:effectRef idx="0">
+                <a:schemeClr val="accent1"/>
+              </a:effectRef>
+              <a:fontRef idx="minor">
+                <a:schemeClr val="lt1"/>
+              </a:fontRef>
+            </p:style>
+            <p:txBody>
+              <a:bodyPr rtlCol="0" anchor="ctr"/>
+              <a:lstStyle/>
+              <a:p>
+                <a:pPr algn="ctr"/>
+                <a:endParaRPr lang="en-US" sz="1200"/>
+              </a:p>
+            </p:txBody>
+          </p:sp>
+          <p:sp>
+            <p:nvSpPr>
+              <p:cNvPr id="20" name="TextBox 19">
+                <a:extLst>
+                  <a:ext uri="{FF2B5EF4-FFF2-40B4-BE49-F238E27FC236}">
+                    <a16:creationId xmlns:a16="http://schemas.microsoft.com/office/drawing/2014/main" id="{F6FED98C-57B1-8B24-F096-02862ECB555C}"/>
+                  </a:ext>
+                </a:extLst>
+              </p:cNvPr>
+              <p:cNvSpPr txBox="1"/>
+              <p:nvPr/>
+            </p:nvSpPr>
+            <p:spPr>
+              <a:xfrm>
+                <a:off x="1427298" y="4195126"/>
+                <a:ext cx="747553" cy="381258"/>
+              </a:xfrm>
+              <a:prstGeom prst="rect">
+                <a:avLst/>
+              </a:prstGeom>
+              <a:solidFill>
+                <a:schemeClr val="bg1"/>
+              </a:solidFill>
+              <a:ln>
                 <a:solidFill>
-                  <a:schemeClr val="bg1">
-                    <a:lumMod val="65000"/>
-                  </a:schemeClr>
+                  <a:schemeClr val="tx1"/>
                 </a:solidFill>
-              </a:rPr>
-              <a:t>associativity</a:t>
-            </a:r>
-          </a:p>
-        </p:txBody>
-      </p:sp>
-      <p:sp>
-        <p:nvSpPr>
-          <p:cNvPr id="78" name="TextBox 77">
-            <a:extLst>
-              <a:ext uri="{FF2B5EF4-FFF2-40B4-BE49-F238E27FC236}">
-                <a16:creationId xmlns:a16="http://schemas.microsoft.com/office/drawing/2014/main" id="{A53D799B-88FB-0EFA-3408-B6B212E7FC2B}"/>
-              </a:ext>
-            </a:extLst>
-          </p:cNvPr>
-          <p:cNvSpPr txBox="1"/>
-          <p:nvPr/>
-        </p:nvSpPr>
-        <p:spPr>
-          <a:xfrm>
-            <a:off x="3867410" y="676244"/>
-            <a:ext cx="1485984" cy="369332"/>
-          </a:xfrm>
-          <a:prstGeom prst="rect">
-            <a:avLst/>
-          </a:prstGeom>
-          <a:noFill/>
-          <a:ln>
-            <a:solidFill>
+              </a:ln>
+            </p:spPr>
+            <p:txBody>
+              <a:bodyPr wrap="none" rtlCol="0">
+                <a:spAutoFit/>
+              </a:bodyPr>
+              <a:lstStyle/>
+              <a:p>
+                <a:r>
+                  <a:rPr lang="en-US" sz="1200" dirty="0"/>
+                  <a:t>Class</a:t>
+                </a:r>
+              </a:p>
+            </p:txBody>
+          </p:sp>
+          <p:sp>
+            <p:nvSpPr>
+              <p:cNvPr id="22" name="TextBox 21">
+                <a:extLst>
+                  <a:ext uri="{FF2B5EF4-FFF2-40B4-BE49-F238E27FC236}">
+                    <a16:creationId xmlns:a16="http://schemas.microsoft.com/office/drawing/2014/main" id="{638A81D3-B823-7C4E-07DC-365005D9A061}"/>
+                  </a:ext>
+                </a:extLst>
+              </p:cNvPr>
+              <p:cNvSpPr txBox="1"/>
+              <p:nvPr/>
+            </p:nvSpPr>
+            <p:spPr>
+              <a:xfrm>
+                <a:off x="1252570" y="4937544"/>
+                <a:ext cx="1058324" cy="381258"/>
+              </a:xfrm>
+              <a:prstGeom prst="rect">
+                <a:avLst/>
+              </a:prstGeom>
+              <a:solidFill>
+                <a:schemeClr val="bg1"/>
+              </a:solidFill>
+              <a:ln>
+                <a:solidFill>
+                  <a:schemeClr val="tx1"/>
+                </a:solidFill>
+              </a:ln>
+            </p:spPr>
+            <p:txBody>
+              <a:bodyPr wrap="none" rtlCol="0">
+                <a:spAutoFit/>
+              </a:bodyPr>
+              <a:lstStyle/>
+              <a:p>
+                <a:r>
+                  <a:rPr lang="en-US" sz="1200" dirty="0"/>
+                  <a:t>Subclass</a:t>
+                </a:r>
+              </a:p>
+            </p:txBody>
+          </p:sp>
+          <p:sp>
+            <p:nvSpPr>
+              <p:cNvPr id="24" name="TextBox 23">
+                <a:extLst>
+                  <a:ext uri="{FF2B5EF4-FFF2-40B4-BE49-F238E27FC236}">
+                    <a16:creationId xmlns:a16="http://schemas.microsoft.com/office/drawing/2014/main" id="{5D057314-8D05-66B4-8A16-5D00E82B908B}"/>
+                  </a:ext>
+                </a:extLst>
+              </p:cNvPr>
+              <p:cNvSpPr txBox="1"/>
+              <p:nvPr/>
+            </p:nvSpPr>
+            <p:spPr>
+              <a:xfrm>
+                <a:off x="1187993" y="3175711"/>
+                <a:ext cx="1230738" cy="635430"/>
+              </a:xfrm>
+              <a:prstGeom prst="rect">
+                <a:avLst/>
+              </a:prstGeom>
+              <a:solidFill>
+                <a:schemeClr val="bg1"/>
+              </a:solidFill>
+              <a:ln>
+                <a:solidFill>
+                  <a:schemeClr val="tx1"/>
+                </a:solidFill>
+                <a:prstDash val="dash"/>
+              </a:ln>
+            </p:spPr>
+            <p:txBody>
+              <a:bodyPr wrap="none" rtlCol="0">
+                <a:spAutoFit/>
+              </a:bodyPr>
+              <a:lstStyle>
+                <a:defPPr>
+                  <a:defRPr lang="en-US"/>
+                </a:defPPr>
+                <a:lvl1pPr algn="ctr"/>
+              </a:lstStyle>
+              <a:p>
+                <a:r>
+                  <a:rPr lang="en-US" sz="1200" dirty="0"/>
+                  <a:t>Abstract</a:t>
+                </a:r>
+              </a:p>
+              <a:p>
+                <a:r>
+                  <a:rPr lang="en-US" sz="1200" dirty="0"/>
+                  <a:t>Base Class</a:t>
+                </a:r>
+              </a:p>
+            </p:txBody>
+          </p:sp>
+          <p:sp>
+            <p:nvSpPr>
+              <p:cNvPr id="26" name="TextBox 25">
+                <a:extLst>
+                  <a:ext uri="{FF2B5EF4-FFF2-40B4-BE49-F238E27FC236}">
+                    <a16:creationId xmlns:a16="http://schemas.microsoft.com/office/drawing/2014/main" id="{08D3A72B-6335-C1E7-B19A-E411C4AACD6C}"/>
+                  </a:ext>
+                </a:extLst>
+              </p:cNvPr>
+              <p:cNvSpPr txBox="1"/>
+              <p:nvPr/>
+            </p:nvSpPr>
+            <p:spPr>
+              <a:xfrm>
+                <a:off x="2772622" y="4195126"/>
+                <a:ext cx="747553" cy="381258"/>
+              </a:xfrm>
+              <a:prstGeom prst="rect">
+                <a:avLst/>
+              </a:prstGeom>
+              <a:solidFill>
+                <a:schemeClr val="bg1"/>
+              </a:solidFill>
+              <a:ln>
+                <a:solidFill>
+                  <a:schemeClr val="tx1"/>
+                </a:solidFill>
+              </a:ln>
+            </p:spPr>
+            <p:txBody>
+              <a:bodyPr wrap="none" rtlCol="0">
+                <a:spAutoFit/>
+              </a:bodyPr>
+              <a:lstStyle/>
+              <a:p>
+                <a:r>
+                  <a:rPr lang="en-US" sz="1200" dirty="0"/>
+                  <a:t>Class</a:t>
+                </a:r>
+              </a:p>
+            </p:txBody>
+          </p:sp>
+          <p:sp>
+            <p:nvSpPr>
+              <p:cNvPr id="28" name="TextBox 27">
+                <a:extLst>
+                  <a:ext uri="{FF2B5EF4-FFF2-40B4-BE49-F238E27FC236}">
+                    <a16:creationId xmlns:a16="http://schemas.microsoft.com/office/drawing/2014/main" id="{DD481312-EB16-DE34-54F9-7BEF082E2F5D}"/>
+                  </a:ext>
+                </a:extLst>
+              </p:cNvPr>
+              <p:cNvSpPr txBox="1"/>
+              <p:nvPr/>
+            </p:nvSpPr>
+            <p:spPr>
+              <a:xfrm>
+                <a:off x="1733567" y="2579834"/>
+                <a:ext cx="1101746" cy="465981"/>
+              </a:xfrm>
+              <a:prstGeom prst="rect">
+                <a:avLst/>
+              </a:prstGeom>
+              <a:noFill/>
+            </p:spPr>
+            <p:txBody>
+              <a:bodyPr wrap="none" rtlCol="0">
+                <a:spAutoFit/>
+              </a:bodyPr>
+              <a:lstStyle/>
+              <a:p>
+                <a:r>
+                  <a:rPr lang="en-US" sz="1600" dirty="0"/>
+                  <a:t>Legend</a:t>
+                </a:r>
+              </a:p>
+            </p:txBody>
+          </p:sp>
+          <p:cxnSp>
+            <p:nvCxnSpPr>
+              <p:cNvPr id="30" name="Straight Arrow Connector 29">
+                <a:extLst>
+                  <a:ext uri="{FF2B5EF4-FFF2-40B4-BE49-F238E27FC236}">
+                    <a16:creationId xmlns:a16="http://schemas.microsoft.com/office/drawing/2014/main" id="{CADAA371-66E1-6B4C-275D-C412DC751565}"/>
+                  </a:ext>
+                </a:extLst>
+              </p:cNvPr>
+              <p:cNvCxnSpPr>
+                <a:cxnSpLocks/>
+                <a:stCxn id="24" idx="2"/>
+                <a:endCxn id="20" idx="0"/>
+              </p:cNvCxnSpPr>
+              <p:nvPr/>
+            </p:nvCxnSpPr>
+            <p:spPr>
+              <a:xfrm flipH="1">
+                <a:off x="1801075" y="3811141"/>
+                <a:ext cx="2288" cy="383986"/>
+              </a:xfrm>
+              <a:prstGeom prst="straightConnector1">
+                <a:avLst/>
+              </a:prstGeom>
+              <a:ln>
+                <a:tailEnd type="triangle"/>
+              </a:ln>
+            </p:spPr>
+            <p:style>
+              <a:lnRef idx="2">
+                <a:schemeClr val="accent1"/>
+              </a:lnRef>
+              <a:fillRef idx="0">
+                <a:schemeClr val="accent1"/>
+              </a:fillRef>
+              <a:effectRef idx="1">
+                <a:schemeClr val="accent1"/>
+              </a:effectRef>
+              <a:fontRef idx="minor">
+                <a:schemeClr val="tx1"/>
+              </a:fontRef>
+            </p:style>
+          </p:cxnSp>
+          <p:cxnSp>
+            <p:nvCxnSpPr>
+              <p:cNvPr id="33" name="Straight Arrow Connector 32">
+                <a:extLst>
+                  <a:ext uri="{FF2B5EF4-FFF2-40B4-BE49-F238E27FC236}">
+                    <a16:creationId xmlns:a16="http://schemas.microsoft.com/office/drawing/2014/main" id="{A451444B-9734-FB94-573F-1DA5409E3AB4}"/>
+                  </a:ext>
+                </a:extLst>
+              </p:cNvPr>
+              <p:cNvCxnSpPr>
+                <a:cxnSpLocks/>
+                <a:stCxn id="20" idx="2"/>
+                <a:endCxn id="22" idx="0"/>
+              </p:cNvCxnSpPr>
+              <p:nvPr/>
+            </p:nvCxnSpPr>
+            <p:spPr>
+              <a:xfrm flipH="1">
+                <a:off x="1781732" y="4576384"/>
+                <a:ext cx="19343" cy="361160"/>
+              </a:xfrm>
+              <a:prstGeom prst="straightConnector1">
+                <a:avLst/>
+              </a:prstGeom>
+              <a:ln>
+                <a:tailEnd type="triangle"/>
+              </a:ln>
+            </p:spPr>
+            <p:style>
+              <a:lnRef idx="2">
+                <a:schemeClr val="accent1"/>
+              </a:lnRef>
+              <a:fillRef idx="0">
+                <a:schemeClr val="accent1"/>
+              </a:fillRef>
+              <a:effectRef idx="1">
+                <a:schemeClr val="accent1"/>
+              </a:effectRef>
+              <a:fontRef idx="minor">
+                <a:schemeClr val="tx1"/>
+              </a:fontRef>
+            </p:style>
+          </p:cxnSp>
+          <p:cxnSp>
+            <p:nvCxnSpPr>
+              <p:cNvPr id="38" name="Straight Arrow Connector 37">
+                <a:extLst>
+                  <a:ext uri="{FF2B5EF4-FFF2-40B4-BE49-F238E27FC236}">
+                    <a16:creationId xmlns:a16="http://schemas.microsoft.com/office/drawing/2014/main" id="{C1696908-46F3-1A78-828C-CCA544740480}"/>
+                  </a:ext>
+                </a:extLst>
+              </p:cNvPr>
+              <p:cNvCxnSpPr>
+                <a:cxnSpLocks/>
+                <a:stCxn id="26" idx="1"/>
+                <a:endCxn id="20" idx="3"/>
+              </p:cNvCxnSpPr>
+              <p:nvPr/>
+            </p:nvCxnSpPr>
+            <p:spPr>
+              <a:xfrm flipH="1">
+                <a:off x="2174851" y="4385756"/>
+                <a:ext cx="597770" cy="0"/>
+              </a:xfrm>
+              <a:prstGeom prst="straightConnector1">
+                <a:avLst/>
+              </a:prstGeom>
+              <a:ln>
+                <a:prstDash val="dash"/>
+                <a:tailEnd type="triangle"/>
+              </a:ln>
+            </p:spPr>
+            <p:style>
+              <a:lnRef idx="2">
+                <a:schemeClr val="accent1"/>
+              </a:lnRef>
+              <a:fillRef idx="0">
+                <a:schemeClr val="accent1"/>
+              </a:fillRef>
+              <a:effectRef idx="1">
+                <a:schemeClr val="accent1"/>
+              </a:effectRef>
+              <a:fontRef idx="minor">
+                <a:schemeClr val="tx1"/>
+              </a:fontRef>
+            </p:style>
+          </p:cxnSp>
+        </p:grpSp>
+        <p:sp>
+          <p:nvSpPr>
+            <p:cNvPr id="37" name="TextBox 36">
+              <a:extLst>
+                <a:ext uri="{FF2B5EF4-FFF2-40B4-BE49-F238E27FC236}">
+                  <a16:creationId xmlns:a16="http://schemas.microsoft.com/office/drawing/2014/main" id="{EB3ED349-9394-4CC7-562A-7C4F45725D81}"/>
+                </a:ext>
+              </a:extLst>
+            </p:cNvPr>
+            <p:cNvSpPr txBox="1"/>
+            <p:nvPr/>
+          </p:nvSpPr>
+          <p:spPr>
+            <a:xfrm>
+              <a:off x="8725694" y="1597921"/>
+              <a:ext cx="1204176" cy="246221"/>
+            </a:xfrm>
+            <a:prstGeom prst="rect">
+              <a:avLst/>
+            </a:prstGeom>
+            <a:noFill/>
+          </p:spPr>
+          <p:txBody>
+            <a:bodyPr wrap="none" rtlCol="0">
+              <a:spAutoFit/>
+            </a:bodyPr>
+            <a:lstStyle/>
+            <a:p>
+              <a:r>
+                <a:rPr lang="en-US" sz="1000" i="1" dirty="0"/>
+                <a:t>flow of inheritance</a:t>
+              </a:r>
+            </a:p>
+          </p:txBody>
+        </p:sp>
+        <p:sp>
+          <p:nvSpPr>
+            <p:cNvPr id="41" name="TextBox 40">
+              <a:extLst>
+                <a:ext uri="{FF2B5EF4-FFF2-40B4-BE49-F238E27FC236}">
+                  <a16:creationId xmlns:a16="http://schemas.microsoft.com/office/drawing/2014/main" id="{7DF383D3-3BF4-3566-3EB4-3A37C522A560}"/>
+                </a:ext>
+              </a:extLst>
+            </p:cNvPr>
+            <p:cNvSpPr txBox="1"/>
+            <p:nvPr/>
+          </p:nvSpPr>
+          <p:spPr>
+            <a:xfrm>
+              <a:off x="9007254" y="1987884"/>
+              <a:ext cx="481222" cy="246221"/>
+            </a:xfrm>
+            <a:prstGeom prst="rect">
+              <a:avLst/>
+            </a:prstGeom>
+            <a:noFill/>
+          </p:spPr>
+          <p:txBody>
+            <a:bodyPr wrap="none" rtlCol="0">
+              <a:spAutoFit/>
+            </a:bodyPr>
+            <a:lstStyle/>
+            <a:p>
+              <a:r>
+                <a:rPr lang="en-US" sz="1000" i="1" dirty="0"/>
+                <a:t>has a</a:t>
+              </a:r>
+            </a:p>
+          </p:txBody>
+        </p:sp>
+        <p:cxnSp>
+          <p:nvCxnSpPr>
+            <p:cNvPr id="42" name="Straight Arrow Connector 41">
+              <a:extLst>
+                <a:ext uri="{FF2B5EF4-FFF2-40B4-BE49-F238E27FC236}">
+                  <a16:creationId xmlns:a16="http://schemas.microsoft.com/office/drawing/2014/main" id="{98F3EDD7-870E-445B-48F7-F7BCCCC879F1}"/>
+                </a:ext>
+              </a:extLst>
+            </p:cNvPr>
+            <p:cNvCxnSpPr>
+              <a:cxnSpLocks/>
+              <a:stCxn id="13" idx="1"/>
+              <a:endCxn id="9" idx="3"/>
+            </p:cNvCxnSpPr>
+            <p:nvPr/>
+          </p:nvCxnSpPr>
+          <p:spPr>
+            <a:xfrm flipH="1" flipV="1">
+              <a:off x="6360741" y="4360289"/>
+              <a:ext cx="1387966" cy="236980"/>
+            </a:xfrm>
+            <a:prstGeom prst="straightConnector1">
+              <a:avLst/>
+            </a:prstGeom>
+            <a:ln>
+              <a:prstDash val="dash"/>
+              <a:tailEnd type="triangle"/>
+            </a:ln>
+          </p:spPr>
+          <p:style>
+            <a:lnRef idx="2">
+              <a:schemeClr val="accent1"/>
+            </a:lnRef>
+            <a:fillRef idx="0">
+              <a:schemeClr val="accent1"/>
+            </a:fillRef>
+            <a:effectRef idx="1">
+              <a:schemeClr val="accent1"/>
+            </a:effectRef>
+            <a:fontRef idx="minor">
               <a:schemeClr val="tx1"/>
-            </a:solidFill>
-          </a:ln>
-        </p:spPr>
-        <p:txBody>
-          <a:bodyPr wrap="none" rtlCol="0">
-            <a:spAutoFit/>
-          </a:bodyPr>
-          <a:lstStyle/>
-          <a:p>
-            <a:r>
-              <a:rPr lang="en-US" dirty="0" err="1"/>
-              <a:t>FiniteAlgebra</a:t>
-            </a:r>
-            <a:endParaRPr lang="en-US" dirty="0"/>
-          </a:p>
-        </p:txBody>
-      </p:sp>
-      <p:cxnSp>
-        <p:nvCxnSpPr>
-          <p:cNvPr id="79" name="Straight Arrow Connector 78">
-            <a:extLst>
-              <a:ext uri="{FF2B5EF4-FFF2-40B4-BE49-F238E27FC236}">
-                <a16:creationId xmlns:a16="http://schemas.microsoft.com/office/drawing/2014/main" id="{C049567E-74E6-A974-558F-A057D3254596}"/>
-              </a:ext>
-            </a:extLst>
-          </p:cNvPr>
-          <p:cNvCxnSpPr>
-            <a:cxnSpLocks/>
-            <a:stCxn id="78" idx="2"/>
-            <a:endCxn id="4" idx="0"/>
-          </p:cNvCxnSpPr>
-          <p:nvPr/>
-        </p:nvCxnSpPr>
-        <p:spPr>
-          <a:xfrm>
-            <a:off x="4610402" y="1045576"/>
-            <a:ext cx="3818" cy="363700"/>
-          </a:xfrm>
-          <a:prstGeom prst="straightConnector1">
-            <a:avLst/>
-          </a:prstGeom>
-          <a:ln>
-            <a:tailEnd type="triangle"/>
-          </a:ln>
-        </p:spPr>
-        <p:style>
-          <a:lnRef idx="2">
-            <a:schemeClr val="accent1"/>
-          </a:lnRef>
-          <a:fillRef idx="0">
-            <a:schemeClr val="accent1"/>
-          </a:fillRef>
-          <a:effectRef idx="1">
-            <a:schemeClr val="accent1"/>
-          </a:effectRef>
-          <a:fontRef idx="minor">
-            <a:schemeClr val="tx1"/>
-          </a:fontRef>
-        </p:style>
-      </p:cxnSp>
-      <p:sp>
-        <p:nvSpPr>
-          <p:cNvPr id="83" name="TextBox 82">
-            <a:extLst>
-              <a:ext uri="{FF2B5EF4-FFF2-40B4-BE49-F238E27FC236}">
-                <a16:creationId xmlns:a16="http://schemas.microsoft.com/office/drawing/2014/main" id="{E8048652-5C70-A340-B5AB-E1817B9391C7}"/>
-              </a:ext>
-            </a:extLst>
-          </p:cNvPr>
-          <p:cNvSpPr txBox="1"/>
-          <p:nvPr/>
-        </p:nvSpPr>
-        <p:spPr>
-          <a:xfrm>
-            <a:off x="6992199" y="2977370"/>
-            <a:ext cx="1287981" cy="923330"/>
-          </a:xfrm>
-          <a:prstGeom prst="rect">
-            <a:avLst/>
-          </a:prstGeom>
-          <a:noFill/>
-          <a:ln>
-            <a:solidFill>
+            </a:fontRef>
+          </p:style>
+        </p:cxnSp>
+        <p:cxnSp>
+          <p:nvCxnSpPr>
+            <p:cNvPr id="45" name="Straight Arrow Connector 44">
+              <a:extLst>
+                <a:ext uri="{FF2B5EF4-FFF2-40B4-BE49-F238E27FC236}">
+                  <a16:creationId xmlns:a16="http://schemas.microsoft.com/office/drawing/2014/main" id="{C420EE72-A158-2850-8405-A2F3E65E8EB7}"/>
+                </a:ext>
+              </a:extLst>
+            </p:cNvPr>
+            <p:cNvCxnSpPr>
+              <a:cxnSpLocks/>
+              <a:stCxn id="13" idx="1"/>
+              <a:endCxn id="10" idx="3"/>
+            </p:cNvCxnSpPr>
+            <p:nvPr/>
+          </p:nvCxnSpPr>
+          <p:spPr>
+            <a:xfrm flipH="1">
+              <a:off x="6266131" y="4597269"/>
+              <a:ext cx="1482576" cy="369332"/>
+            </a:xfrm>
+            <a:prstGeom prst="straightConnector1">
+              <a:avLst/>
+            </a:prstGeom>
+            <a:ln>
+              <a:prstDash val="dash"/>
+              <a:tailEnd type="triangle"/>
+            </a:ln>
+          </p:spPr>
+          <p:style>
+            <a:lnRef idx="2">
+              <a:schemeClr val="accent1"/>
+            </a:lnRef>
+            <a:fillRef idx="0">
+              <a:schemeClr val="accent1"/>
+            </a:fillRef>
+            <a:effectRef idx="1">
+              <a:schemeClr val="accent1"/>
+            </a:effectRef>
+            <a:fontRef idx="minor">
               <a:schemeClr val="tx1"/>
-            </a:solidFill>
-          </a:ln>
-        </p:spPr>
-        <p:txBody>
-          <a:bodyPr wrap="none" rtlCol="0">
-            <a:spAutoFit/>
-          </a:bodyPr>
-          <a:lstStyle/>
-          <a:p>
-            <a:pPr algn="ctr"/>
-            <a:r>
-              <a:rPr lang="en-US" dirty="0"/>
-              <a:t>Finite</a:t>
-            </a:r>
-          </a:p>
-          <a:p>
-            <a:pPr algn="ctr"/>
-            <a:r>
-              <a:rPr lang="en-US" dirty="0"/>
-              <a:t>Composite</a:t>
-            </a:r>
-          </a:p>
-          <a:p>
-            <a:pPr algn="ctr"/>
-            <a:r>
-              <a:rPr lang="en-US" dirty="0"/>
-              <a:t>Algebra</a:t>
-            </a:r>
-          </a:p>
-        </p:txBody>
-      </p:sp>
-      <p:cxnSp>
-        <p:nvCxnSpPr>
-          <p:cNvPr id="84" name="Straight Arrow Connector 83">
-            <a:extLst>
-              <a:ext uri="{FF2B5EF4-FFF2-40B4-BE49-F238E27FC236}">
-                <a16:creationId xmlns:a16="http://schemas.microsoft.com/office/drawing/2014/main" id="{B1C72590-3B0A-AB2B-A8C4-57CC9F9FBDE6}"/>
-              </a:ext>
-            </a:extLst>
-          </p:cNvPr>
-          <p:cNvCxnSpPr>
-            <a:cxnSpLocks/>
-            <a:stCxn id="83" idx="2"/>
-            <a:endCxn id="13" idx="0"/>
-          </p:cNvCxnSpPr>
-          <p:nvPr/>
-        </p:nvCxnSpPr>
-        <p:spPr>
-          <a:xfrm flipH="1">
-            <a:off x="7636189" y="3900700"/>
-            <a:ext cx="1" cy="276999"/>
-          </a:xfrm>
-          <a:prstGeom prst="straightConnector1">
-            <a:avLst/>
-          </a:prstGeom>
-          <a:ln>
-            <a:tailEnd type="triangle"/>
-          </a:ln>
-        </p:spPr>
-        <p:style>
-          <a:lnRef idx="2">
-            <a:schemeClr val="accent1"/>
-          </a:lnRef>
-          <a:fillRef idx="0">
-            <a:schemeClr val="accent1"/>
-          </a:fillRef>
-          <a:effectRef idx="1">
-            <a:schemeClr val="accent1"/>
-          </a:effectRef>
-          <a:fontRef idx="minor">
-            <a:schemeClr val="tx1"/>
-          </a:fontRef>
-        </p:style>
-      </p:cxnSp>
-      <p:cxnSp>
-        <p:nvCxnSpPr>
-          <p:cNvPr id="87" name="Straight Arrow Connector 86">
-            <a:extLst>
-              <a:ext uri="{FF2B5EF4-FFF2-40B4-BE49-F238E27FC236}">
-                <a16:creationId xmlns:a16="http://schemas.microsoft.com/office/drawing/2014/main" id="{53A2F2FC-5290-8CED-D06A-C18281569569}"/>
-              </a:ext>
-            </a:extLst>
-          </p:cNvPr>
-          <p:cNvCxnSpPr>
-            <a:cxnSpLocks/>
-            <a:stCxn id="13" idx="2"/>
-            <a:endCxn id="12" idx="0"/>
-          </p:cNvCxnSpPr>
-          <p:nvPr/>
-        </p:nvCxnSpPr>
-        <p:spPr>
-          <a:xfrm flipH="1">
-            <a:off x="7636188" y="4547031"/>
-            <a:ext cx="1" cy="421646"/>
-          </a:xfrm>
-          <a:prstGeom prst="straightConnector1">
-            <a:avLst/>
-          </a:prstGeom>
-          <a:ln>
-            <a:tailEnd type="triangle"/>
-          </a:ln>
-        </p:spPr>
-        <p:style>
-          <a:lnRef idx="2">
-            <a:schemeClr val="accent1"/>
-          </a:lnRef>
-          <a:fillRef idx="0">
-            <a:schemeClr val="accent1"/>
-          </a:fillRef>
-          <a:effectRef idx="1">
-            <a:schemeClr val="accent1"/>
-          </a:effectRef>
-          <a:fontRef idx="minor">
-            <a:schemeClr val="tx1"/>
-          </a:fontRef>
-        </p:style>
-      </p:cxnSp>
-      <p:cxnSp>
-        <p:nvCxnSpPr>
-          <p:cNvPr id="97" name="Straight Arrow Connector 96">
-            <a:extLst>
-              <a:ext uri="{FF2B5EF4-FFF2-40B4-BE49-F238E27FC236}">
-                <a16:creationId xmlns:a16="http://schemas.microsoft.com/office/drawing/2014/main" id="{FCB7A106-EF4C-B808-F7DD-088EAA12087A}"/>
-              </a:ext>
-            </a:extLst>
-          </p:cNvPr>
-          <p:cNvCxnSpPr>
-            <a:cxnSpLocks/>
-            <a:stCxn id="9" idx="3"/>
-            <a:endCxn id="13" idx="1"/>
-          </p:cNvCxnSpPr>
-          <p:nvPr/>
-        </p:nvCxnSpPr>
-        <p:spPr>
-          <a:xfrm>
-            <a:off x="5781588" y="4125385"/>
-            <a:ext cx="1387966" cy="236980"/>
-          </a:xfrm>
-          <a:prstGeom prst="straightConnector1">
-            <a:avLst/>
-          </a:prstGeom>
-          <a:ln>
-            <a:solidFill>
-              <a:schemeClr val="bg1">
-                <a:lumMod val="65000"/>
-              </a:schemeClr>
-            </a:solidFill>
-            <a:prstDash val="dash"/>
-            <a:tailEnd type="triangle"/>
-          </a:ln>
-        </p:spPr>
-        <p:style>
-          <a:lnRef idx="2">
-            <a:schemeClr val="accent1"/>
-          </a:lnRef>
-          <a:fillRef idx="0">
-            <a:schemeClr val="accent1"/>
-          </a:fillRef>
-          <a:effectRef idx="1">
-            <a:schemeClr val="accent1"/>
-          </a:effectRef>
-          <a:fontRef idx="minor">
-            <a:schemeClr val="tx1"/>
-          </a:fontRef>
-        </p:style>
-      </p:cxnSp>
-      <p:cxnSp>
-        <p:nvCxnSpPr>
-          <p:cNvPr id="100" name="Straight Arrow Connector 99">
-            <a:extLst>
-              <a:ext uri="{FF2B5EF4-FFF2-40B4-BE49-F238E27FC236}">
-                <a16:creationId xmlns:a16="http://schemas.microsoft.com/office/drawing/2014/main" id="{81BE1019-009B-847F-9F5A-4D38BC69D5A1}"/>
-              </a:ext>
-            </a:extLst>
-          </p:cNvPr>
-          <p:cNvCxnSpPr>
-            <a:cxnSpLocks/>
-            <a:stCxn id="9" idx="3"/>
-            <a:endCxn id="12" idx="1"/>
-          </p:cNvCxnSpPr>
-          <p:nvPr/>
-        </p:nvCxnSpPr>
-        <p:spPr>
-          <a:xfrm>
-            <a:off x="5781588" y="4125385"/>
-            <a:ext cx="1125746" cy="1027958"/>
-          </a:xfrm>
-          <a:prstGeom prst="straightConnector1">
-            <a:avLst/>
-          </a:prstGeom>
-          <a:ln>
-            <a:solidFill>
-              <a:schemeClr val="bg1">
-                <a:lumMod val="65000"/>
-              </a:schemeClr>
-            </a:solidFill>
-            <a:prstDash val="dash"/>
-            <a:tailEnd type="triangle"/>
-          </a:ln>
-        </p:spPr>
-        <p:style>
-          <a:lnRef idx="2">
-            <a:schemeClr val="accent1"/>
-          </a:lnRef>
-          <a:fillRef idx="0">
-            <a:schemeClr val="accent1"/>
-          </a:fillRef>
-          <a:effectRef idx="1">
-            <a:schemeClr val="accent1"/>
-          </a:effectRef>
-          <a:fontRef idx="minor">
-            <a:schemeClr val="tx1"/>
-          </a:fontRef>
-        </p:style>
-      </p:cxnSp>
-      <p:cxnSp>
-        <p:nvCxnSpPr>
-          <p:cNvPr id="103" name="Straight Arrow Connector 102">
-            <a:extLst>
-              <a:ext uri="{FF2B5EF4-FFF2-40B4-BE49-F238E27FC236}">
-                <a16:creationId xmlns:a16="http://schemas.microsoft.com/office/drawing/2014/main" id="{95D3AC2E-3D6A-A342-E288-453928ED1233}"/>
-              </a:ext>
-            </a:extLst>
-          </p:cNvPr>
-          <p:cNvCxnSpPr>
-            <a:cxnSpLocks/>
-            <a:stCxn id="10" idx="3"/>
-            <a:endCxn id="13" idx="1"/>
-          </p:cNvCxnSpPr>
-          <p:nvPr/>
-        </p:nvCxnSpPr>
-        <p:spPr>
-          <a:xfrm flipV="1">
-            <a:off x="5686978" y="4362365"/>
-            <a:ext cx="1482576" cy="369332"/>
-          </a:xfrm>
-          <a:prstGeom prst="straightConnector1">
-            <a:avLst/>
-          </a:prstGeom>
-          <a:ln>
-            <a:solidFill>
-              <a:schemeClr val="bg1">
-                <a:lumMod val="65000"/>
-              </a:schemeClr>
-            </a:solidFill>
-            <a:prstDash val="dash"/>
-            <a:tailEnd type="triangle"/>
-          </a:ln>
-        </p:spPr>
-        <p:style>
-          <a:lnRef idx="2">
-            <a:schemeClr val="accent1"/>
-          </a:lnRef>
-          <a:fillRef idx="0">
-            <a:schemeClr val="accent1"/>
-          </a:fillRef>
-          <a:effectRef idx="1">
-            <a:schemeClr val="accent1"/>
-          </a:effectRef>
-          <a:fontRef idx="minor">
-            <a:schemeClr val="tx1"/>
-          </a:fontRef>
-        </p:style>
-      </p:cxnSp>
-      <p:cxnSp>
-        <p:nvCxnSpPr>
-          <p:cNvPr id="106" name="Straight Arrow Connector 105">
-            <a:extLst>
-              <a:ext uri="{FF2B5EF4-FFF2-40B4-BE49-F238E27FC236}">
-                <a16:creationId xmlns:a16="http://schemas.microsoft.com/office/drawing/2014/main" id="{1B5FC531-8353-A03A-02B7-B0E83E602695}"/>
-              </a:ext>
-            </a:extLst>
-          </p:cNvPr>
-          <p:cNvCxnSpPr>
-            <a:cxnSpLocks/>
-            <a:stCxn id="11" idx="3"/>
-            <a:endCxn id="12" idx="1"/>
-          </p:cNvCxnSpPr>
-          <p:nvPr/>
-        </p:nvCxnSpPr>
-        <p:spPr>
-          <a:xfrm flipV="1">
-            <a:off x="5712497" y="5153343"/>
-            <a:ext cx="1194837" cy="184666"/>
-          </a:xfrm>
-          <a:prstGeom prst="straightConnector1">
-            <a:avLst/>
-          </a:prstGeom>
-          <a:ln>
-            <a:solidFill>
-              <a:schemeClr val="bg1">
-                <a:lumMod val="65000"/>
-              </a:schemeClr>
-            </a:solidFill>
-            <a:prstDash val="dash"/>
-            <a:tailEnd type="triangle"/>
-          </a:ln>
-        </p:spPr>
-        <p:style>
-          <a:lnRef idx="2">
-            <a:schemeClr val="accent1"/>
-          </a:lnRef>
-          <a:fillRef idx="0">
-            <a:schemeClr val="accent1"/>
-          </a:fillRef>
-          <a:effectRef idx="1">
-            <a:schemeClr val="accent1"/>
-          </a:effectRef>
-          <a:fontRef idx="minor">
-            <a:schemeClr val="tx1"/>
-          </a:fontRef>
-        </p:style>
-      </p:cxnSp>
-      <p:cxnSp>
-        <p:nvCxnSpPr>
-          <p:cNvPr id="109" name="Straight Arrow Connector 108">
-            <a:extLst>
-              <a:ext uri="{FF2B5EF4-FFF2-40B4-BE49-F238E27FC236}">
-                <a16:creationId xmlns:a16="http://schemas.microsoft.com/office/drawing/2014/main" id="{EA490DB7-FE54-F64F-1BC4-8810A3DF3136}"/>
-              </a:ext>
-            </a:extLst>
-          </p:cNvPr>
-          <p:cNvCxnSpPr>
-            <a:cxnSpLocks/>
-            <a:stCxn id="13" idx="3"/>
-            <a:endCxn id="60" idx="1"/>
-          </p:cNvCxnSpPr>
-          <p:nvPr/>
-        </p:nvCxnSpPr>
-        <p:spPr>
-          <a:xfrm>
-            <a:off x="8102823" y="4362365"/>
-            <a:ext cx="677708" cy="0"/>
-          </a:xfrm>
-          <a:prstGeom prst="straightConnector1">
-            <a:avLst/>
-          </a:prstGeom>
-          <a:ln>
-            <a:tailEnd type="triangle"/>
-          </a:ln>
-        </p:spPr>
-        <p:style>
-          <a:lnRef idx="2">
-            <a:schemeClr val="accent1"/>
-          </a:lnRef>
-          <a:fillRef idx="0">
-            <a:schemeClr val="accent1"/>
-          </a:fillRef>
-          <a:effectRef idx="1">
-            <a:schemeClr val="accent1"/>
-          </a:effectRef>
-          <a:fontRef idx="minor">
-            <a:schemeClr val="tx1"/>
-          </a:fontRef>
-        </p:style>
-      </p:cxnSp>
-      <p:cxnSp>
-        <p:nvCxnSpPr>
-          <p:cNvPr id="112" name="Straight Arrow Connector 111">
-            <a:extLst>
-              <a:ext uri="{FF2B5EF4-FFF2-40B4-BE49-F238E27FC236}">
-                <a16:creationId xmlns:a16="http://schemas.microsoft.com/office/drawing/2014/main" id="{8AE88354-471D-461F-708B-29D8BC1B096C}"/>
-              </a:ext>
-            </a:extLst>
-          </p:cNvPr>
-          <p:cNvCxnSpPr>
-            <a:cxnSpLocks/>
-            <a:stCxn id="12" idx="3"/>
-            <a:endCxn id="59" idx="1"/>
-          </p:cNvCxnSpPr>
-          <p:nvPr/>
-        </p:nvCxnSpPr>
-        <p:spPr>
-          <a:xfrm>
-            <a:off x="8365041" y="5153343"/>
-            <a:ext cx="415490" cy="0"/>
-          </a:xfrm>
-          <a:prstGeom prst="straightConnector1">
-            <a:avLst/>
-          </a:prstGeom>
-          <a:ln>
-            <a:tailEnd type="triangle"/>
-          </a:ln>
-        </p:spPr>
-        <p:style>
-          <a:lnRef idx="2">
-            <a:schemeClr val="accent1"/>
-          </a:lnRef>
-          <a:fillRef idx="0">
-            <a:schemeClr val="accent1"/>
-          </a:fillRef>
-          <a:effectRef idx="1">
-            <a:schemeClr val="accent1"/>
-          </a:effectRef>
-          <a:fontRef idx="minor">
-            <a:schemeClr val="tx1"/>
-          </a:fontRef>
-        </p:style>
-      </p:cxnSp>
+            </a:fontRef>
+          </p:style>
+        </p:cxnSp>
+        <p:cxnSp>
+          <p:nvCxnSpPr>
+            <p:cNvPr id="48" name="Straight Arrow Connector 47">
+              <a:extLst>
+                <a:ext uri="{FF2B5EF4-FFF2-40B4-BE49-F238E27FC236}">
+                  <a16:creationId xmlns:a16="http://schemas.microsoft.com/office/drawing/2014/main" id="{0EA8CE83-DDEC-E760-33A3-A2FA136175DB}"/>
+                </a:ext>
+              </a:extLst>
+            </p:cNvPr>
+            <p:cNvCxnSpPr>
+              <a:cxnSpLocks/>
+              <a:stCxn id="12" idx="1"/>
+              <a:endCxn id="9" idx="3"/>
+            </p:cNvCxnSpPr>
+            <p:nvPr/>
+          </p:nvCxnSpPr>
+          <p:spPr>
+            <a:xfrm flipH="1" flipV="1">
+              <a:off x="6360741" y="4360289"/>
+              <a:ext cx="1125746" cy="1027958"/>
+            </a:xfrm>
+            <a:prstGeom prst="straightConnector1">
+              <a:avLst/>
+            </a:prstGeom>
+            <a:ln>
+              <a:prstDash val="dash"/>
+              <a:tailEnd type="triangle"/>
+            </a:ln>
+          </p:spPr>
+          <p:style>
+            <a:lnRef idx="2">
+              <a:schemeClr val="accent1"/>
+            </a:lnRef>
+            <a:fillRef idx="0">
+              <a:schemeClr val="accent1"/>
+            </a:fillRef>
+            <a:effectRef idx="1">
+              <a:schemeClr val="accent1"/>
+            </a:effectRef>
+            <a:fontRef idx="minor">
+              <a:schemeClr val="tx1"/>
+            </a:fontRef>
+          </p:style>
+        </p:cxnSp>
+        <p:cxnSp>
+          <p:nvCxnSpPr>
+            <p:cNvPr id="51" name="Straight Arrow Connector 50">
+              <a:extLst>
+                <a:ext uri="{FF2B5EF4-FFF2-40B4-BE49-F238E27FC236}">
+                  <a16:creationId xmlns:a16="http://schemas.microsoft.com/office/drawing/2014/main" id="{9ABCC235-72CC-131F-39BE-846314AE6A0B}"/>
+                </a:ext>
+              </a:extLst>
+            </p:cNvPr>
+            <p:cNvCxnSpPr>
+              <a:cxnSpLocks/>
+              <a:stCxn id="12" idx="1"/>
+              <a:endCxn id="11" idx="3"/>
+            </p:cNvCxnSpPr>
+            <p:nvPr/>
+          </p:nvCxnSpPr>
+          <p:spPr>
+            <a:xfrm flipH="1">
+              <a:off x="6291650" y="5388247"/>
+              <a:ext cx="1194837" cy="184666"/>
+            </a:xfrm>
+            <a:prstGeom prst="straightConnector1">
+              <a:avLst/>
+            </a:prstGeom>
+            <a:ln>
+              <a:prstDash val="dash"/>
+              <a:tailEnd type="triangle"/>
+            </a:ln>
+          </p:spPr>
+          <p:style>
+            <a:lnRef idx="2">
+              <a:schemeClr val="accent1"/>
+            </a:lnRef>
+            <a:fillRef idx="0">
+              <a:schemeClr val="accent1"/>
+            </a:fillRef>
+            <a:effectRef idx="1">
+              <a:schemeClr val="accent1"/>
+            </a:effectRef>
+            <a:fontRef idx="minor">
+              <a:schemeClr val="tx1"/>
+            </a:fontRef>
+          </p:style>
+        </p:cxnSp>
+      </p:grpSp>
     </p:spTree>
     <p:extLst>
       <p:ext uri="{BB962C8B-B14F-4D97-AF65-F5344CB8AC3E}">

</xml_diff>